<commit_message>
Updates to image border markdown
</commit_message>
<xml_diff>
--- a/learn-pr/student-evangelism/develop-secure-iot-solutions-azure-sphere-iot-central/resources/azure-device-twins-c2d-pattern.pptx
+++ b/learn-pr/student-evangelism/develop-secure-iot-solutions-azure-sphere-iot-central/resources/azure-device-twins-c2d-pattern.pptx
@@ -5,10 +5,11 @@
     <p:sldMasterId id="2147483660" r:id="rId1"/>
   </p:sldMasterIdLst>
   <p:notesMasterIdLst>
-    <p:notesMasterId r:id="rId3"/>
+    <p:notesMasterId r:id="rId4"/>
   </p:notesMasterIdLst>
   <p:sldIdLst>
     <p:sldId id="2076138167" r:id="rId2"/>
+    <p:sldId id="2076138168" r:id="rId3"/>
   </p:sldIdLst>
   <p:sldSz cx="12192000" cy="6858000"/>
   <p:notesSz cx="6858000" cy="9144000"/>
@@ -617,6 +618,169 @@
     <p:extLst>
       <p:ext uri="{BB962C8B-B14F-4D97-AF65-F5344CB8AC3E}">
         <p14:creationId xmlns:p14="http://schemas.microsoft.com/office/powerpoint/2010/main" val="2476958265"/>
+      </p:ext>
+    </p:extLst>
+  </p:cSld>
+  <p:clrMapOvr>
+    <a:masterClrMapping/>
+  </p:clrMapOvr>
+</p:notes>
+</file>
+
+<file path=ppt/notesSlides/notesSlide2.xml><?xml version="1.0" encoding="utf-8"?>
+<p:notes xmlns:a="http://schemas.openxmlformats.org/drawingml/2006/main" xmlns:r="http://schemas.openxmlformats.org/officeDocument/2006/relationships" xmlns:p="http://schemas.openxmlformats.org/presentationml/2006/main">
+  <p:cSld>
+    <p:spTree>
+      <p:nvGrpSpPr>
+        <p:cNvPr id="1" name=""/>
+        <p:cNvGrpSpPr/>
+        <p:nvPr/>
+      </p:nvGrpSpPr>
+      <p:grpSpPr>
+        <a:xfrm>
+          <a:off x="0" y="0"/>
+          <a:ext cx="0" cy="0"/>
+          <a:chOff x="0" y="0"/>
+          <a:chExt cx="0" cy="0"/>
+        </a:xfrm>
+      </p:grpSpPr>
+      <p:sp>
+        <p:nvSpPr>
+          <p:cNvPr id="2" name="Slide Image Placeholder 1"/>
+          <p:cNvSpPr>
+            <a:spLocks noGrp="1" noRot="1" noChangeAspect="1"/>
+          </p:cNvSpPr>
+          <p:nvPr>
+            <p:ph type="sldImg"/>
+          </p:nvPr>
+        </p:nvSpPr>
+        <p:spPr>
+          <a:xfrm>
+            <a:off x="138113" y="1347788"/>
+            <a:ext cx="6462712" cy="3636962"/>
+          </a:xfrm>
+        </p:spPr>
+      </p:sp>
+      <p:sp>
+        <p:nvSpPr>
+          <p:cNvPr id="3" name="Notes Placeholder 2"/>
+          <p:cNvSpPr>
+            <a:spLocks noGrp="1"/>
+          </p:cNvSpPr>
+          <p:nvPr>
+            <p:ph type="body" idx="1"/>
+          </p:nvPr>
+        </p:nvSpPr>
+        <p:spPr/>
+        <p:txBody>
+          <a:bodyPr>
+            <a:normAutofit/>
+          </a:bodyPr>
+          <a:lstStyle/>
+          <a:p>
+            <a:r>
+              <a:rPr lang="en-AU"/>
+              <a:t>Change the rate the sensor </a:t>
+            </a:r>
+            <a:r>
+              <a:rPr lang="en-AU" err="1"/>
+              <a:t>os</a:t>
+            </a:r>
+            <a:r>
+              <a:rPr lang="en-AU"/>
+              <a:t> measured</a:t>
+            </a:r>
+            <a:endParaRPr/>
+          </a:p>
+        </p:txBody>
+      </p:sp>
+      <p:sp>
+        <p:nvSpPr>
+          <p:cNvPr id="4" name="Slide Number Placeholder 3"/>
+          <p:cNvSpPr>
+            <a:spLocks noGrp="1"/>
+          </p:cNvSpPr>
+          <p:nvPr>
+            <p:ph type="sldNum" sz="quarter" idx="10"/>
+          </p:nvPr>
+        </p:nvSpPr>
+        <p:spPr/>
+        <p:txBody>
+          <a:bodyPr/>
+          <a:lstStyle/>
+          <a:p>
+            <a:pPr marL="0" marR="0" lvl="0" indent="0" algn="r" defTabSz="914400" rtl="0" eaLnBrk="1" fontAlgn="auto" latinLnBrk="0" hangingPunct="1">
+              <a:lnSpc>
+                <a:spcPct val="100000"/>
+              </a:lnSpc>
+              <a:spcBef>
+                <a:spcPts val="0"/>
+              </a:spcBef>
+              <a:spcAft>
+                <a:spcPts val="0"/>
+              </a:spcAft>
+              <a:buClrTx/>
+              <a:buSzTx/>
+              <a:buFontTx/>
+              <a:buNone/>
+              <a:tabLst/>
+              <a:defRPr/>
+            </a:pPr>
+            <a:fld id="{6101C5E1-D8E9-464D-A93E-CE21651935A7}" type="slidenum">
+              <a:rPr kumimoji="0" lang="en-US" sz="1200" b="0" i="0" u="none" strike="noStrike" kern="1200" cap="none" spc="0" normalizeH="0" baseline="0" noProof="0" smtClean="0">
+                <a:ln>
+                  <a:noFill/>
+                </a:ln>
+                <a:solidFill>
+                  <a:prstClr val="black"/>
+                </a:solidFill>
+                <a:effectLst/>
+                <a:uLnTx/>
+                <a:uFillTx/>
+                <a:latin typeface="Calibri"/>
+                <a:ea typeface="+mn-ea"/>
+                <a:cs typeface="Arial" pitchFamily="34" charset="0"/>
+              </a:rPr>
+              <a:pPr marL="0" marR="0" lvl="0" indent="0" algn="r" defTabSz="914400" rtl="0" eaLnBrk="1" fontAlgn="auto" latinLnBrk="0" hangingPunct="1">
+                <a:lnSpc>
+                  <a:spcPct val="100000"/>
+                </a:lnSpc>
+                <a:spcBef>
+                  <a:spcPts val="0"/>
+                </a:spcBef>
+                <a:spcAft>
+                  <a:spcPts val="0"/>
+                </a:spcAft>
+                <a:buClrTx/>
+                <a:buSzTx/>
+                <a:buFontTx/>
+                <a:buNone/>
+                <a:tabLst/>
+                <a:defRPr/>
+              </a:pPr>
+              <a:t>2</a:t>
+            </a:fld>
+            <a:endParaRPr kumimoji="0" lang="en-US" sz="1200" b="0" i="0" u="none" strike="noStrike" kern="1200" cap="none" spc="0" normalizeH="0" baseline="0" noProof="0">
+              <a:ln>
+                <a:noFill/>
+              </a:ln>
+              <a:solidFill>
+                <a:prstClr val="black"/>
+              </a:solidFill>
+              <a:effectLst/>
+              <a:uLnTx/>
+              <a:uFillTx/>
+              <a:latin typeface="Calibri"/>
+              <a:ea typeface="+mn-ea"/>
+              <a:cs typeface="Arial" pitchFamily="34" charset="0"/>
+            </a:endParaRPr>
+          </a:p>
+        </p:txBody>
+      </p:sp>
+    </p:spTree>
+    <p:extLst>
+      <p:ext uri="{BB962C8B-B14F-4D97-AF65-F5344CB8AC3E}">
+        <p14:creationId xmlns:p14="http://schemas.microsoft.com/office/powerpoint/2010/main" val="3294702561"/>
       </p:ext>
     </p:extLst>
   </p:cSld>
@@ -18513,10 +18677,10 @@
       </p:pic>
       <p:sp>
         <p:nvSpPr>
-          <p:cNvPr id="37" name="Oval 36">
-            <a:extLst>
-              <a:ext uri="{FF2B5EF4-FFF2-40B4-BE49-F238E27FC236}">
-                <a16:creationId xmlns:a16="http://schemas.microsoft.com/office/drawing/2014/main" id="{C4704B70-6D45-413E-A194-E21001C7378F}"/>
+          <p:cNvPr id="76" name="Oval 75">
+            <a:extLst>
+              <a:ext uri="{FF2B5EF4-FFF2-40B4-BE49-F238E27FC236}">
+                <a16:creationId xmlns:a16="http://schemas.microsoft.com/office/drawing/2014/main" id="{FA171BA4-28A3-4DEF-94E1-2C6806F8D72A}"/>
               </a:ext>
             </a:extLst>
           </p:cNvPr>
@@ -18525,7 +18689,7 @@
         </p:nvSpPr>
         <p:spPr>
           <a:xfrm>
-            <a:off x="3028306" y="2728639"/>
+            <a:off x="3028306" y="5311230"/>
             <a:ext cx="256674" cy="248652"/>
           </a:xfrm>
           <a:prstGeom prst="ellipse">
@@ -18583,83 +18747,6 @@
                 <a:ea typeface="Verdana" panose="020B0604030504040204" pitchFamily="34" charset="0"/>
                 <a:cs typeface="Calibri" panose="020F0502020204030204" pitchFamily="34" charset="0"/>
               </a:rPr>
-              <a:t>1</a:t>
-            </a:r>
-          </a:p>
-        </p:txBody>
-      </p:sp>
-      <p:sp>
-        <p:nvSpPr>
-          <p:cNvPr id="76" name="Oval 75">
-            <a:extLst>
-              <a:ext uri="{FF2B5EF4-FFF2-40B4-BE49-F238E27FC236}">
-                <a16:creationId xmlns:a16="http://schemas.microsoft.com/office/drawing/2014/main" id="{FA171BA4-28A3-4DEF-94E1-2C6806F8D72A}"/>
-              </a:ext>
-            </a:extLst>
-          </p:cNvPr>
-          <p:cNvSpPr/>
-          <p:nvPr/>
-        </p:nvSpPr>
-        <p:spPr>
-          <a:xfrm>
-            <a:off x="3028306" y="5311230"/>
-            <a:ext cx="256674" cy="248652"/>
-          </a:xfrm>
-          <a:prstGeom prst="ellipse">
-            <a:avLst/>
-          </a:prstGeom>
-          <a:solidFill>
-            <a:srgbClr val="5B9BD5">
-              <a:lumMod val="75000"/>
-            </a:srgbClr>
-          </a:solidFill>
-          <a:ln w="12700" cap="flat" cmpd="sng" algn="ctr">
-            <a:solidFill>
-              <a:srgbClr val="4472C4">
-                <a:shade val="50000"/>
-              </a:srgbClr>
-            </a:solidFill>
-            <a:prstDash val="solid"/>
-            <a:miter lim="800000"/>
-          </a:ln>
-          <a:effectLst/>
-        </p:spPr>
-        <p:txBody>
-          <a:bodyPr rtlCol="0" anchor="ctr"/>
-          <a:lstStyle/>
-          <a:p>
-            <a:pPr marL="0" marR="0" lvl="0" indent="0" algn="ctr" defTabSz="914400" rtl="0" eaLnBrk="1" fontAlgn="auto" latinLnBrk="0" hangingPunct="1">
-              <a:lnSpc>
-                <a:spcPct val="100000"/>
-              </a:lnSpc>
-              <a:spcBef>
-                <a:spcPts val="0"/>
-              </a:spcBef>
-              <a:spcAft>
-                <a:spcPts val="0"/>
-              </a:spcAft>
-              <a:buClrTx/>
-              <a:buSzTx/>
-              <a:buFontTx/>
-              <a:buNone/>
-              <a:tabLst/>
-              <a:defRPr/>
-            </a:pPr>
-            <a:r>
-              <a:rPr kumimoji="0" lang="en-AU" sz="1100" b="0" i="0" u="none" strike="noStrike" kern="0" cap="none" spc="0" normalizeH="0" baseline="0" noProof="0">
-                <a:ln>
-                  <a:noFill/>
-                </a:ln>
-                <a:solidFill>
-                  <a:prstClr val="white"/>
-                </a:solidFill>
-                <a:effectLst/>
-                <a:uLnTx/>
-                <a:uFillTx/>
-                <a:latin typeface="Calibri" panose="020F0502020204030204" pitchFamily="34" charset="0"/>
-                <a:ea typeface="Verdana" panose="020B0604030504040204" pitchFamily="34" charset="0"/>
-                <a:cs typeface="Calibri" panose="020F0502020204030204" pitchFamily="34" charset="0"/>
-              </a:rPr>
               <a:t>6</a:t>
             </a:r>
           </a:p>
@@ -18736,83 +18823,6 @@
           <a:effectLst/>
         </p:spPr>
       </p:cxnSp>
-      <p:sp>
-        <p:nvSpPr>
-          <p:cNvPr id="2" name="Oval 1">
-            <a:extLst>
-              <a:ext uri="{FF2B5EF4-FFF2-40B4-BE49-F238E27FC236}">
-                <a16:creationId xmlns:a16="http://schemas.microsoft.com/office/drawing/2014/main" id="{E55674D5-44EE-4A41-8F7B-2546F1ED6E34}"/>
-              </a:ext>
-            </a:extLst>
-          </p:cNvPr>
-          <p:cNvSpPr/>
-          <p:nvPr/>
-        </p:nvSpPr>
-        <p:spPr>
-          <a:xfrm>
-            <a:off x="5694329" y="3454724"/>
-            <a:ext cx="256674" cy="248652"/>
-          </a:xfrm>
-          <a:prstGeom prst="ellipse">
-            <a:avLst/>
-          </a:prstGeom>
-          <a:solidFill>
-            <a:srgbClr val="5B9BD5">
-              <a:lumMod val="75000"/>
-            </a:srgbClr>
-          </a:solidFill>
-          <a:ln w="12700" cap="flat" cmpd="sng" algn="ctr">
-            <a:solidFill>
-              <a:srgbClr val="4472C4">
-                <a:shade val="50000"/>
-              </a:srgbClr>
-            </a:solidFill>
-            <a:prstDash val="solid"/>
-            <a:miter lim="800000"/>
-          </a:ln>
-          <a:effectLst/>
-        </p:spPr>
-        <p:txBody>
-          <a:bodyPr rtlCol="0" anchor="ctr"/>
-          <a:lstStyle/>
-          <a:p>
-            <a:pPr marL="0" marR="0" lvl="0" indent="0" algn="ctr" defTabSz="914400" rtl="0" eaLnBrk="1" fontAlgn="auto" latinLnBrk="0" hangingPunct="1">
-              <a:lnSpc>
-                <a:spcPct val="100000"/>
-              </a:lnSpc>
-              <a:spcBef>
-                <a:spcPts val="0"/>
-              </a:spcBef>
-              <a:spcAft>
-                <a:spcPts val="0"/>
-              </a:spcAft>
-              <a:buClrTx/>
-              <a:buSzTx/>
-              <a:buFontTx/>
-              <a:buNone/>
-              <a:tabLst/>
-              <a:defRPr/>
-            </a:pPr>
-            <a:r>
-              <a:rPr kumimoji="0" lang="en-AU" sz="1100" b="0" i="0" u="none" strike="noStrike" kern="0" cap="none" spc="0" normalizeH="0" baseline="0" noProof="0" dirty="0">
-                <a:ln>
-                  <a:noFill/>
-                </a:ln>
-                <a:solidFill>
-                  <a:prstClr val="white"/>
-                </a:solidFill>
-                <a:effectLst/>
-                <a:uLnTx/>
-                <a:uFillTx/>
-                <a:latin typeface="Calibri" panose="020F0502020204030204" pitchFamily="34" charset="0"/>
-                <a:ea typeface="Verdana" panose="020B0604030504040204" pitchFamily="34" charset="0"/>
-                <a:cs typeface="Calibri" panose="020F0502020204030204" pitchFamily="34" charset="0"/>
-              </a:rPr>
-              <a:t>2</a:t>
-            </a:r>
-          </a:p>
-        </p:txBody>
-      </p:sp>
       <p:sp>
         <p:nvSpPr>
           <p:cNvPr id="4" name="Rectangle 3">
@@ -19015,7 +19025,7 @@
                 <a:latin typeface="Calibri" panose="020F0502020204030204" pitchFamily="34" charset="0"/>
                 <a:cs typeface="Calibri" panose="020F0502020204030204" pitchFamily="34" charset="0"/>
               </a:rPr>
-              <a:t>Environment telemetry service thread</a:t>
+              <a:t>Environment service thread</a:t>
             </a:r>
           </a:p>
         </p:txBody>
@@ -19086,7 +19096,7 @@
                 <a:latin typeface="Calibri" panose="020F0502020204030204" pitchFamily="34" charset="0"/>
                 <a:cs typeface="Calibri" panose="020F0502020204030204" pitchFamily="34" charset="0"/>
               </a:rPr>
-              <a:t>Environment telemetry sense thread</a:t>
+              <a:t>Environment sensor thread</a:t>
             </a:r>
             <a:endParaRPr kumimoji="0" lang="en-AU" sz="1200" b="0" i="0" u="none" strike="noStrike" kern="1200" cap="none" spc="0" normalizeH="0" baseline="0" noProof="0" dirty="0">
               <a:ln>
@@ -19365,7 +19375,7 @@
         </p:nvSpPr>
         <p:spPr>
           <a:xfrm>
-            <a:off x="7437385" y="3284881"/>
+            <a:off x="9470780" y="3156378"/>
             <a:ext cx="256674" cy="248652"/>
           </a:xfrm>
           <a:prstGeom prst="ellipse">
@@ -19450,7 +19460,7 @@
         </p:nvSpPr>
         <p:spPr>
           <a:xfrm>
-            <a:off x="5694097" y="4828472"/>
+            <a:off x="3028306" y="2730385"/>
             <a:ext cx="256674" cy="248652"/>
           </a:xfrm>
           <a:prstGeom prst="ellipse">
@@ -19527,7 +19537,7 @@
         </p:nvSpPr>
         <p:spPr>
           <a:xfrm>
-            <a:off x="11170578" y="4920514"/>
+            <a:off x="7180711" y="4470061"/>
             <a:ext cx="256674" cy="248652"/>
           </a:xfrm>
           <a:prstGeom prst="ellipse">
@@ -19571,15 +19581,21 @@
               <a:defRPr/>
             </a:pPr>
             <a:r>
-              <a:rPr lang="en-AU" sz="1100" kern="0" dirty="0">
+              <a:rPr kumimoji="0" lang="en-US" sz="1100" b="0" i="0" u="none" strike="noStrike" kern="0" cap="none" spc="0" normalizeH="0" baseline="0" noProof="0" dirty="0">
+                <a:ln>
+                  <a:noFill/>
+                </a:ln>
                 <a:solidFill>
                   <a:prstClr val="white"/>
                 </a:solidFill>
+                <a:effectLst/>
+                <a:uLnTx/>
+                <a:uFillTx/>
                 <a:latin typeface="Calibri" panose="020F0502020204030204" pitchFamily="34" charset="0"/>
                 <a:ea typeface="Verdana" panose="020B0604030504040204" pitchFamily="34" charset="0"/>
                 <a:cs typeface="Calibri" panose="020F0502020204030204" pitchFamily="34" charset="0"/>
               </a:rPr>
-              <a:t>5</a:t>
+              <a:t>7</a:t>
             </a:r>
             <a:endParaRPr kumimoji="0" lang="en-AU" sz="1100" b="0" i="0" u="none" strike="noStrike" kern="0" cap="none" spc="0" normalizeH="0" baseline="0" noProof="0" dirty="0">
               <a:ln>
@@ -19717,7 +19733,7 @@
         </p:nvSpPr>
         <p:spPr>
           <a:xfrm>
-            <a:off x="8127184" y="3284881"/>
+            <a:off x="5263048" y="3062830"/>
             <a:ext cx="256674" cy="248652"/>
           </a:xfrm>
           <a:prstGeom prst="ellipse">
@@ -19818,10 +19834,2160 @@
           </a:prstGeom>
         </p:spPr>
       </p:pic>
+      <p:sp>
+        <p:nvSpPr>
+          <p:cNvPr id="2" name="Oval 1">
+            <a:extLst>
+              <a:ext uri="{FF2B5EF4-FFF2-40B4-BE49-F238E27FC236}">
+                <a16:creationId xmlns:a16="http://schemas.microsoft.com/office/drawing/2014/main" id="{E55674D5-44EE-4A41-8F7B-2546F1ED6E34}"/>
+              </a:ext>
+            </a:extLst>
+          </p:cNvPr>
+          <p:cNvSpPr/>
+          <p:nvPr/>
+        </p:nvSpPr>
+        <p:spPr>
+          <a:xfrm>
+            <a:off x="7155768" y="3149053"/>
+            <a:ext cx="256674" cy="248652"/>
+          </a:xfrm>
+          <a:prstGeom prst="ellipse">
+            <a:avLst/>
+          </a:prstGeom>
+          <a:solidFill>
+            <a:srgbClr val="5B9BD5">
+              <a:lumMod val="75000"/>
+            </a:srgbClr>
+          </a:solidFill>
+          <a:ln w="12700" cap="flat" cmpd="sng" algn="ctr">
+            <a:solidFill>
+              <a:srgbClr val="4472C4">
+                <a:shade val="50000"/>
+              </a:srgbClr>
+            </a:solidFill>
+            <a:prstDash val="solid"/>
+            <a:miter lim="800000"/>
+          </a:ln>
+          <a:effectLst/>
+        </p:spPr>
+        <p:txBody>
+          <a:bodyPr rtlCol="0" anchor="ctr"/>
+          <a:lstStyle/>
+          <a:p>
+            <a:pPr marL="0" marR="0" lvl="0" indent="0" algn="ctr" defTabSz="914400" rtl="0" eaLnBrk="1" fontAlgn="auto" latinLnBrk="0" hangingPunct="1">
+              <a:lnSpc>
+                <a:spcPct val="100000"/>
+              </a:lnSpc>
+              <a:spcBef>
+                <a:spcPts val="0"/>
+              </a:spcBef>
+              <a:spcAft>
+                <a:spcPts val="0"/>
+              </a:spcAft>
+              <a:buClrTx/>
+              <a:buSzTx/>
+              <a:buFontTx/>
+              <a:buNone/>
+              <a:tabLst/>
+              <a:defRPr/>
+            </a:pPr>
+            <a:r>
+              <a:rPr kumimoji="0" lang="en-AU" sz="1100" b="0" i="0" u="none" strike="noStrike" kern="0" cap="none" spc="0" normalizeH="0" baseline="0" noProof="0" dirty="0">
+                <a:ln>
+                  <a:noFill/>
+                </a:ln>
+                <a:solidFill>
+                  <a:prstClr val="white"/>
+                </a:solidFill>
+                <a:effectLst/>
+                <a:uLnTx/>
+                <a:uFillTx/>
+                <a:latin typeface="Calibri" panose="020F0502020204030204" pitchFamily="34" charset="0"/>
+                <a:ea typeface="Verdana" panose="020B0604030504040204" pitchFamily="34" charset="0"/>
+                <a:cs typeface="Calibri" panose="020F0502020204030204" pitchFamily="34" charset="0"/>
+              </a:rPr>
+              <a:t>2</a:t>
+            </a:r>
+          </a:p>
+        </p:txBody>
+      </p:sp>
+      <p:sp>
+        <p:nvSpPr>
+          <p:cNvPr id="37" name="Oval 36">
+            <a:extLst>
+              <a:ext uri="{FF2B5EF4-FFF2-40B4-BE49-F238E27FC236}">
+                <a16:creationId xmlns:a16="http://schemas.microsoft.com/office/drawing/2014/main" id="{C4704B70-6D45-413E-A194-E21001C7378F}"/>
+              </a:ext>
+            </a:extLst>
+          </p:cNvPr>
+          <p:cNvSpPr/>
+          <p:nvPr/>
+        </p:nvSpPr>
+        <p:spPr>
+          <a:xfrm>
+            <a:off x="9471424" y="4413889"/>
+            <a:ext cx="256674" cy="248652"/>
+          </a:xfrm>
+          <a:prstGeom prst="ellipse">
+            <a:avLst/>
+          </a:prstGeom>
+          <a:solidFill>
+            <a:srgbClr val="5B9BD5">
+              <a:lumMod val="75000"/>
+            </a:srgbClr>
+          </a:solidFill>
+          <a:ln w="12700" cap="flat" cmpd="sng" algn="ctr">
+            <a:solidFill>
+              <a:srgbClr val="4472C4">
+                <a:shade val="50000"/>
+              </a:srgbClr>
+            </a:solidFill>
+            <a:prstDash val="solid"/>
+            <a:miter lim="800000"/>
+          </a:ln>
+          <a:effectLst/>
+        </p:spPr>
+        <p:txBody>
+          <a:bodyPr rtlCol="0" anchor="ctr"/>
+          <a:lstStyle/>
+          <a:p>
+            <a:pPr marL="0" marR="0" lvl="0" indent="0" algn="ctr" defTabSz="914400" rtl="0" eaLnBrk="1" fontAlgn="auto" latinLnBrk="0" hangingPunct="1">
+              <a:lnSpc>
+                <a:spcPct val="100000"/>
+              </a:lnSpc>
+              <a:spcBef>
+                <a:spcPts val="0"/>
+              </a:spcBef>
+              <a:spcAft>
+                <a:spcPts val="0"/>
+              </a:spcAft>
+              <a:buClrTx/>
+              <a:buSzTx/>
+              <a:buFontTx/>
+              <a:buNone/>
+              <a:tabLst/>
+              <a:defRPr/>
+            </a:pPr>
+            <a:r>
+              <a:rPr kumimoji="0" lang="en-AU" sz="1100" b="0" i="0" u="none" strike="noStrike" kern="0" cap="none" spc="0" normalizeH="0" baseline="0" noProof="0" dirty="0">
+                <a:ln>
+                  <a:noFill/>
+                </a:ln>
+                <a:solidFill>
+                  <a:prstClr val="white"/>
+                </a:solidFill>
+                <a:effectLst/>
+                <a:uLnTx/>
+                <a:uFillTx/>
+                <a:latin typeface="Calibri" panose="020F0502020204030204" pitchFamily="34" charset="0"/>
+                <a:ea typeface="Verdana" panose="020B0604030504040204" pitchFamily="34" charset="0"/>
+                <a:cs typeface="Calibri" panose="020F0502020204030204" pitchFamily="34" charset="0"/>
+              </a:rPr>
+              <a:t>1</a:t>
+            </a:r>
+          </a:p>
+        </p:txBody>
+      </p:sp>
+      <p:pic>
+        <p:nvPicPr>
+          <p:cNvPr id="7" name="Picture 6">
+            <a:extLst>
+              <a:ext uri="{FF2B5EF4-FFF2-40B4-BE49-F238E27FC236}">
+                <a16:creationId xmlns:a16="http://schemas.microsoft.com/office/drawing/2014/main" id="{E90AF6C0-7B51-4508-B21D-04F2181B1D33}"/>
+              </a:ext>
+            </a:extLst>
+          </p:cNvPr>
+          <p:cNvPicPr>
+            <a:picLocks noChangeAspect="1"/>
+          </p:cNvPicPr>
+          <p:nvPr/>
+        </p:nvPicPr>
+        <p:blipFill>
+          <a:blip r:embed="rId9"/>
+          <a:stretch>
+            <a:fillRect/>
+          </a:stretch>
+        </p:blipFill>
+        <p:spPr>
+          <a:xfrm>
+            <a:off x="1978464" y="4359900"/>
+            <a:ext cx="1130303" cy="874854"/>
+          </a:xfrm>
+          <a:prstGeom prst="rect">
+            <a:avLst/>
+          </a:prstGeom>
+        </p:spPr>
+      </p:pic>
     </p:spTree>
     <p:extLst>
       <p:ext uri="{BB962C8B-B14F-4D97-AF65-F5344CB8AC3E}">
         <p14:creationId xmlns:p14="http://schemas.microsoft.com/office/powerpoint/2010/main" val="540651820"/>
+      </p:ext>
+    </p:extLst>
+  </p:cSld>
+  <p:clrMapOvr>
+    <a:masterClrMapping/>
+  </p:clrMapOvr>
+  <p:transition/>
+</p:sld>
+</file>
+
+<file path=ppt/slides/slide2.xml><?xml version="1.0" encoding="utf-8"?>
+<p:sld xmlns:a="http://schemas.openxmlformats.org/drawingml/2006/main" xmlns:r="http://schemas.openxmlformats.org/officeDocument/2006/relationships" xmlns:p="http://schemas.openxmlformats.org/presentationml/2006/main">
+  <p:cSld>
+    <p:spTree>
+      <p:nvGrpSpPr>
+        <p:cNvPr id="1" name=""/>
+        <p:cNvGrpSpPr/>
+        <p:nvPr/>
+      </p:nvGrpSpPr>
+      <p:grpSpPr>
+        <a:xfrm>
+          <a:off x="0" y="0"/>
+          <a:ext cx="0" cy="0"/>
+          <a:chOff x="0" y="0"/>
+          <a:chExt cx="0" cy="0"/>
+        </a:xfrm>
+      </p:grpSpPr>
+      <p:sp>
+        <p:nvSpPr>
+          <p:cNvPr id="5" name="TextBox"/>
+          <p:cNvSpPr txBox="1">
+            <a:spLocks noGrp="1" noSelect="1" noRot="1" noMove="1"/>
+          </p:cNvSpPr>
+          <p:nvPr/>
+        </p:nvSpPr>
+        <p:spPr>
+          <a:xfrm>
+            <a:off x="2890520" y="2644140"/>
+            <a:ext cx="6411372" cy="1569660"/>
+          </a:xfrm>
+          <a:prstGeom prst="rect">
+            <a:avLst/>
+          </a:prstGeom>
+          <a:noFill/>
+        </p:spPr>
+        <p:txBody>
+          <a:bodyPr wrap="none" rtlCol="0" anchor="ctr" anchorCtr="1">
+            <a:spAutoFit/>
+          </a:bodyPr>
+          <a:lstStyle>
+            <a:lvl1pPr algn="l">
+              <a:lnSpc>
+                <a:spcPct val="150000"/>
+              </a:lnSpc>
+              <a:spcBef>
+                <a:spcPct val="0"/>
+              </a:spcBef>
+              <a:spcAft>
+                <a:spcPct val="0"/>
+              </a:spcAft>
+              <a:defRPr lang="en-US" sz="3200" b="1" noProof="1" dirty="0">
+                <a:solidFill>
+                  <a:prstClr val="red">
+                    <a:lumOff val="30000"/>
+                    <a:alpha val="40000"/>
+                  </a:prstClr>
+                </a:solidFill>
+                <a:effectLst>
+                  <a:outerShdw blurRad="50800" dist="38100" algn="tr" rotWithShape="0">
+                    <a:prstClr val="black">
+                      <a:alpha val="80000"/>
+                    </a:prstClr>
+                  </a:outerShdw>
+                </a:effectLst>
+                <a:latin typeface="Calibri" pitchFamily="34" charset="0"/>
+              </a:defRPr>
+            </a:lvl1pPr>
+          </a:lstStyle>
+          <a:p>
+            <a:pPr marL="0" marR="0" lvl="0" indent="0" algn="ctr" defTabSz="914400" rtl="0" eaLnBrk="1" fontAlgn="auto" latinLnBrk="0" hangingPunct="1">
+              <a:lnSpc>
+                <a:spcPct val="150000"/>
+              </a:lnSpc>
+              <a:spcBef>
+                <a:spcPct val="0"/>
+              </a:spcBef>
+              <a:spcAft>
+                <a:spcPct val="0"/>
+              </a:spcAft>
+              <a:buClrTx/>
+              <a:buSzTx/>
+              <a:buFontTx/>
+              <a:buNone/>
+              <a:tabLst/>
+              <a:defRPr/>
+            </a:pPr>
+            <a:endParaRPr kumimoji="0" lang="en-US" sz="3200" b="1" i="0" u="none" strike="noStrike" kern="1200" cap="none" spc="0" normalizeH="0" baseline="0" noProof="1">
+              <a:ln>
+                <a:noFill/>
+              </a:ln>
+              <a:solidFill>
+                <a:prstClr val="red">
+                  <a:lumOff val="30000"/>
+                  <a:alpha val="40000"/>
+                </a:prstClr>
+              </a:solidFill>
+              <a:effectLst>
+                <a:outerShdw blurRad="50800" dist="38100" algn="tr" rotWithShape="0">
+                  <a:prstClr val="black">
+                    <a:alpha val="80000"/>
+                  </a:prstClr>
+                </a:outerShdw>
+              </a:effectLst>
+              <a:uLnTx/>
+              <a:uFillTx/>
+              <a:latin typeface="Calibri" pitchFamily="34" charset="0"/>
+              <a:cs typeface="Arial" pitchFamily="34" charset="0"/>
+            </a:endParaRPr>
+          </a:p>
+          <a:p>
+            <a:pPr marL="0" marR="0" lvl="0" indent="0" algn="ctr" defTabSz="914400" rtl="0" eaLnBrk="1" fontAlgn="auto" latinLnBrk="0" hangingPunct="1">
+              <a:lnSpc>
+                <a:spcPct val="150000"/>
+              </a:lnSpc>
+              <a:spcBef>
+                <a:spcPct val="0"/>
+              </a:spcBef>
+              <a:spcAft>
+                <a:spcPct val="0"/>
+              </a:spcAft>
+              <a:buClrTx/>
+              <a:buSzTx/>
+              <a:buFontTx/>
+              <a:buNone/>
+              <a:tabLst/>
+              <a:defRPr/>
+            </a:pPr>
+            <a:endParaRPr kumimoji="0" lang="en-US" sz="3200" b="1" i="0" u="none" strike="noStrike" kern="1200" cap="none" spc="0" normalizeH="0" baseline="0" noProof="1">
+              <a:ln>
+                <a:noFill/>
+              </a:ln>
+              <a:solidFill>
+                <a:prstClr val="red">
+                  <a:lumOff val="30000"/>
+                  <a:alpha val="40000"/>
+                </a:prstClr>
+              </a:solidFill>
+              <a:effectLst>
+                <a:outerShdw blurRad="50800" dist="38100" algn="tr" rotWithShape="0">
+                  <a:prstClr val="black">
+                    <a:alpha val="80000"/>
+                  </a:prstClr>
+                </a:outerShdw>
+              </a:effectLst>
+              <a:uLnTx/>
+              <a:uFillTx/>
+              <a:latin typeface="Calibri" pitchFamily="34" charset="0"/>
+              <a:cs typeface="Arial" pitchFamily="34" charset="0"/>
+            </a:endParaRPr>
+          </a:p>
+          <a:p>
+            <a:pPr marL="0" marR="0" lvl="0" indent="0" algn="ctr" defTabSz="914400" rtl="0" eaLnBrk="1" fontAlgn="auto" latinLnBrk="0" hangingPunct="1">
+              <a:lnSpc>
+                <a:spcPct val="150000"/>
+              </a:lnSpc>
+              <a:spcBef>
+                <a:spcPct val="0"/>
+              </a:spcBef>
+              <a:spcAft>
+                <a:spcPct val="0"/>
+              </a:spcAft>
+              <a:buClrTx/>
+              <a:buSzTx/>
+              <a:buFontTx/>
+              <a:buNone/>
+              <a:tabLst/>
+              <a:defRPr/>
+            </a:pPr>
+            <a:endParaRPr kumimoji="0" lang="en-US" sz="3200" b="1" i="0" u="none" strike="noStrike" kern="1200" cap="none" spc="0" normalizeH="0" baseline="0" noProof="1">
+              <a:ln>
+                <a:noFill/>
+              </a:ln>
+              <a:solidFill>
+                <a:prstClr val="red">
+                  <a:lumOff val="30000"/>
+                  <a:alpha val="40000"/>
+                </a:prstClr>
+              </a:solidFill>
+              <a:effectLst>
+                <a:outerShdw blurRad="50800" dist="38100" algn="tr" rotWithShape="0">
+                  <a:prstClr val="black">
+                    <a:alpha val="80000"/>
+                  </a:prstClr>
+                </a:outerShdw>
+              </a:effectLst>
+              <a:uLnTx/>
+              <a:uFillTx/>
+              <a:latin typeface="Calibri" pitchFamily="34" charset="0"/>
+              <a:cs typeface="Arial" pitchFamily="34" charset="0"/>
+            </a:endParaRPr>
+          </a:p>
+        </p:txBody>
+      </p:sp>
+      <p:sp>
+        <p:nvSpPr>
+          <p:cNvPr id="64" name="Rectangle 63">
+            <a:extLst>
+              <a:ext uri="{FF2B5EF4-FFF2-40B4-BE49-F238E27FC236}">
+                <a16:creationId xmlns:a16="http://schemas.microsoft.com/office/drawing/2014/main" id="{4412024A-277C-45A0-837A-49D0779D3523}"/>
+              </a:ext>
+            </a:extLst>
+          </p:cNvPr>
+          <p:cNvSpPr/>
+          <p:nvPr/>
+        </p:nvSpPr>
+        <p:spPr>
+          <a:xfrm>
+            <a:off x="3936484" y="2171276"/>
+            <a:ext cx="1588551" cy="3727062"/>
+          </a:xfrm>
+          <a:prstGeom prst="rect">
+            <a:avLst/>
+          </a:prstGeom>
+          <a:solidFill>
+            <a:schemeClr val="accent1">
+              <a:lumMod val="40000"/>
+              <a:lumOff val="60000"/>
+            </a:schemeClr>
+          </a:solidFill>
+          <a:ln w="12700" cap="flat" cmpd="sng" algn="ctr">
+            <a:solidFill>
+              <a:srgbClr val="4472C4">
+                <a:shade val="50000"/>
+              </a:srgbClr>
+            </a:solidFill>
+            <a:prstDash val="solid"/>
+            <a:miter lim="800000"/>
+          </a:ln>
+          <a:effectLst/>
+        </p:spPr>
+        <p:txBody>
+          <a:bodyPr rtlCol="0" anchor="t"/>
+          <a:lstStyle/>
+          <a:p>
+            <a:pPr marL="0" marR="0" lvl="0" indent="0" algn="ctr" defTabSz="914400" rtl="0" eaLnBrk="1" fontAlgn="auto" latinLnBrk="0" hangingPunct="1">
+              <a:lnSpc>
+                <a:spcPct val="100000"/>
+              </a:lnSpc>
+              <a:spcBef>
+                <a:spcPts val="0"/>
+              </a:spcBef>
+              <a:spcAft>
+                <a:spcPts val="0"/>
+              </a:spcAft>
+              <a:buClrTx/>
+              <a:buSzTx/>
+              <a:buFontTx/>
+              <a:buNone/>
+              <a:tabLst/>
+              <a:defRPr/>
+            </a:pPr>
+            <a:r>
+              <a:rPr kumimoji="0" lang="en-AU" sz="1400" b="0" i="0" u="none" strike="noStrike" kern="0" cap="none" spc="0" normalizeH="0" baseline="0" noProof="0" dirty="0">
+                <a:ln>
+                  <a:noFill/>
+                </a:ln>
+                <a:solidFill>
+                  <a:prstClr val="black"/>
+                </a:solidFill>
+                <a:effectLst/>
+                <a:uLnTx/>
+                <a:uFillTx/>
+                <a:latin typeface="Calibri" panose="020F0502020204030204" pitchFamily="34" charset="0"/>
+                <a:ea typeface="Verdana" panose="020B0604030504040204" pitchFamily="34" charset="0"/>
+                <a:cs typeface="Calibri" panose="020F0502020204030204" pitchFamily="34" charset="0"/>
+              </a:rPr>
+              <a:t>Azure IoT Hub</a:t>
+            </a:r>
+          </a:p>
+        </p:txBody>
+      </p:sp>
+      <p:sp>
+        <p:nvSpPr>
+          <p:cNvPr id="68" name="Rectangle 67">
+            <a:extLst>
+              <a:ext uri="{FF2B5EF4-FFF2-40B4-BE49-F238E27FC236}">
+                <a16:creationId xmlns:a16="http://schemas.microsoft.com/office/drawing/2014/main" id="{8005BA36-018B-4F25-B5F6-76ED1BB0E9D9}"/>
+              </a:ext>
+            </a:extLst>
+          </p:cNvPr>
+          <p:cNvSpPr/>
+          <p:nvPr/>
+        </p:nvSpPr>
+        <p:spPr>
+          <a:xfrm>
+            <a:off x="4104655" y="3190835"/>
+            <a:ext cx="1295349" cy="1153356"/>
+          </a:xfrm>
+          <a:prstGeom prst="rect">
+            <a:avLst/>
+          </a:prstGeom>
+          <a:solidFill>
+            <a:srgbClr val="FFD44B"/>
+          </a:solidFill>
+          <a:ln w="12700" cap="flat" cmpd="sng" algn="ctr">
+            <a:solidFill>
+              <a:srgbClr val="4472C4">
+                <a:shade val="50000"/>
+              </a:srgbClr>
+            </a:solidFill>
+            <a:prstDash val="solid"/>
+            <a:miter lim="800000"/>
+          </a:ln>
+          <a:effectLst/>
+        </p:spPr>
+        <p:txBody>
+          <a:bodyPr rtlCol="0" anchor="t"/>
+          <a:lstStyle/>
+          <a:p>
+            <a:pPr marL="0" marR="0" lvl="0" indent="0" algn="ctr" defTabSz="914400" rtl="0" eaLnBrk="1" fontAlgn="auto" latinLnBrk="0" hangingPunct="1">
+              <a:lnSpc>
+                <a:spcPct val="100000"/>
+              </a:lnSpc>
+              <a:spcBef>
+                <a:spcPts val="0"/>
+              </a:spcBef>
+              <a:spcAft>
+                <a:spcPts val="0"/>
+              </a:spcAft>
+              <a:buClrTx/>
+              <a:buSzTx/>
+              <a:buFontTx/>
+              <a:buNone/>
+              <a:tabLst/>
+              <a:defRPr/>
+            </a:pPr>
+            <a:r>
+              <a:rPr kumimoji="0" lang="en-AU" sz="1100" b="0" i="0" u="none" strike="noStrike" kern="0" cap="none" spc="0" normalizeH="0" baseline="0" noProof="0" dirty="0">
+                <a:ln>
+                  <a:noFill/>
+                </a:ln>
+                <a:solidFill>
+                  <a:srgbClr val="000000"/>
+                </a:solidFill>
+                <a:effectLst/>
+                <a:uLnTx/>
+                <a:uFillTx/>
+                <a:latin typeface="Calibri" panose="020F0502020204030204" pitchFamily="34" charset="0"/>
+                <a:ea typeface="Verdana" panose="020B0604030504040204" pitchFamily="34" charset="0"/>
+                <a:cs typeface="Calibri" panose="020F0502020204030204" pitchFamily="34" charset="0"/>
+              </a:rPr>
+              <a:t>IoT Hub Messaging</a:t>
+            </a:r>
+          </a:p>
+        </p:txBody>
+      </p:sp>
+      <p:sp>
+        <p:nvSpPr>
+          <p:cNvPr id="70" name="Rectangle 69">
+            <a:extLst>
+              <a:ext uri="{FF2B5EF4-FFF2-40B4-BE49-F238E27FC236}">
+                <a16:creationId xmlns:a16="http://schemas.microsoft.com/office/drawing/2014/main" id="{A3612737-2893-492F-83AB-078F4974B26A}"/>
+              </a:ext>
+            </a:extLst>
+          </p:cNvPr>
+          <p:cNvSpPr/>
+          <p:nvPr/>
+        </p:nvSpPr>
+        <p:spPr>
+          <a:xfrm>
+            <a:off x="4087788" y="4576491"/>
+            <a:ext cx="1295349" cy="936003"/>
+          </a:xfrm>
+          <a:prstGeom prst="rect">
+            <a:avLst/>
+          </a:prstGeom>
+          <a:solidFill>
+            <a:srgbClr val="FFD44B"/>
+          </a:solidFill>
+          <a:ln w="12700" cap="flat" cmpd="sng" algn="ctr">
+            <a:solidFill>
+              <a:srgbClr val="4472C4">
+                <a:shade val="50000"/>
+              </a:srgbClr>
+            </a:solidFill>
+            <a:prstDash val="solid"/>
+            <a:miter lim="800000"/>
+          </a:ln>
+          <a:effectLst/>
+        </p:spPr>
+        <p:txBody>
+          <a:bodyPr rtlCol="0" anchor="t"/>
+          <a:lstStyle/>
+          <a:p>
+            <a:pPr marL="0" marR="0" lvl="0" indent="0" algn="ctr" defTabSz="914400" rtl="0" eaLnBrk="1" fontAlgn="auto" latinLnBrk="0" hangingPunct="1">
+              <a:lnSpc>
+                <a:spcPct val="100000"/>
+              </a:lnSpc>
+              <a:spcBef>
+                <a:spcPts val="0"/>
+              </a:spcBef>
+              <a:spcAft>
+                <a:spcPts val="0"/>
+              </a:spcAft>
+              <a:buClrTx/>
+              <a:buSzTx/>
+              <a:buFontTx/>
+              <a:buNone/>
+              <a:tabLst/>
+              <a:defRPr/>
+            </a:pPr>
+            <a:r>
+              <a:rPr kumimoji="0" lang="en-AU" sz="1100" b="0" i="0" u="none" strike="noStrike" kern="0" cap="none" spc="0" normalizeH="0" baseline="0" noProof="0" dirty="0">
+                <a:ln>
+                  <a:noFill/>
+                </a:ln>
+                <a:solidFill>
+                  <a:srgbClr val="000000"/>
+                </a:solidFill>
+                <a:effectLst/>
+                <a:uLnTx/>
+                <a:uFillTx/>
+                <a:latin typeface="Calibri" panose="020F0502020204030204" pitchFamily="34" charset="0"/>
+                <a:ea typeface="Verdana" panose="020B0604030504040204" pitchFamily="34" charset="0"/>
+                <a:cs typeface="Calibri" panose="020F0502020204030204" pitchFamily="34" charset="0"/>
+              </a:rPr>
+              <a:t>Device twin</a:t>
+            </a:r>
+          </a:p>
+          <a:p>
+            <a:pPr marL="0" marR="0" lvl="0" indent="0" algn="ctr" defTabSz="914400" rtl="0" eaLnBrk="1" fontAlgn="auto" latinLnBrk="0" hangingPunct="1">
+              <a:lnSpc>
+                <a:spcPct val="100000"/>
+              </a:lnSpc>
+              <a:spcBef>
+                <a:spcPts val="0"/>
+              </a:spcBef>
+              <a:spcAft>
+                <a:spcPts val="0"/>
+              </a:spcAft>
+              <a:buClrTx/>
+              <a:buSzTx/>
+              <a:buFontTx/>
+              <a:buNone/>
+              <a:tabLst/>
+              <a:defRPr/>
+            </a:pPr>
+            <a:r>
+              <a:rPr kumimoji="0" lang="en-AU" sz="1100" b="0" i="0" u="none" strike="noStrike" kern="0" cap="none" spc="0" normalizeH="0" baseline="0" noProof="0" dirty="0">
+                <a:ln>
+                  <a:noFill/>
+                </a:ln>
+                <a:solidFill>
+                  <a:srgbClr val="000000"/>
+                </a:solidFill>
+                <a:effectLst/>
+                <a:uLnTx/>
+                <a:uFillTx/>
+                <a:latin typeface="Calibri" panose="020F0502020204030204" pitchFamily="34" charset="0"/>
+                <a:ea typeface="Verdana" panose="020B0604030504040204" pitchFamily="34" charset="0"/>
+                <a:cs typeface="Calibri" panose="020F0502020204030204" pitchFamily="34" charset="0"/>
+              </a:rPr>
+              <a:t>Desired Temperature</a:t>
+            </a:r>
+          </a:p>
+        </p:txBody>
+      </p:sp>
+      <p:sp>
+        <p:nvSpPr>
+          <p:cNvPr id="71" name="TextBox 70">
+            <a:extLst>
+              <a:ext uri="{FF2B5EF4-FFF2-40B4-BE49-F238E27FC236}">
+                <a16:creationId xmlns:a16="http://schemas.microsoft.com/office/drawing/2014/main" id="{055BFC9A-7691-4161-8395-811F996F585E}"/>
+              </a:ext>
+            </a:extLst>
+          </p:cNvPr>
+          <p:cNvSpPr txBox="1"/>
+          <p:nvPr/>
+        </p:nvSpPr>
+        <p:spPr>
+          <a:xfrm>
+            <a:off x="4283428" y="5180425"/>
+            <a:ext cx="937802" cy="261610"/>
+          </a:xfrm>
+          <a:prstGeom prst="rect">
+            <a:avLst/>
+          </a:prstGeom>
+          <a:solidFill>
+            <a:srgbClr val="5B9BD5">
+              <a:lumMod val="75000"/>
+            </a:srgbClr>
+          </a:solidFill>
+        </p:spPr>
+        <p:txBody>
+          <a:bodyPr wrap="square" rtlCol="0">
+            <a:spAutoFit/>
+          </a:bodyPr>
+          <a:lstStyle/>
+          <a:p>
+            <a:pPr marL="0" marR="0" lvl="0" indent="0" algn="ctr" defTabSz="914400" rtl="0" eaLnBrk="1" fontAlgn="auto" latinLnBrk="0" hangingPunct="1">
+              <a:lnSpc>
+                <a:spcPct val="100000"/>
+              </a:lnSpc>
+              <a:spcBef>
+                <a:spcPts val="0"/>
+              </a:spcBef>
+              <a:spcAft>
+                <a:spcPts val="0"/>
+              </a:spcAft>
+              <a:buClrTx/>
+              <a:buSzTx/>
+              <a:buFontTx/>
+              <a:buNone/>
+              <a:tabLst/>
+              <a:defRPr/>
+            </a:pPr>
+            <a:r>
+              <a:rPr kumimoji="0" lang="en-AU" sz="1100" b="0" i="0" u="none" strike="noStrike" kern="0" cap="none" spc="0" normalizeH="0" baseline="0" noProof="0" dirty="0">
+                <a:ln>
+                  <a:noFill/>
+                </a:ln>
+                <a:solidFill>
+                  <a:prstClr val="white"/>
+                </a:solidFill>
+                <a:effectLst/>
+                <a:uLnTx/>
+                <a:uFillTx/>
+                <a:latin typeface="Calibri" panose="020F0502020204030204" pitchFamily="34" charset="0"/>
+                <a:cs typeface="Calibri" panose="020F0502020204030204" pitchFamily="34" charset="0"/>
+              </a:rPr>
+              <a:t>JSON</a:t>
+            </a:r>
+          </a:p>
+        </p:txBody>
+      </p:sp>
+      <p:pic>
+        <p:nvPicPr>
+          <p:cNvPr id="95" name="Picture 94">
+            <a:extLst>
+              <a:ext uri="{FF2B5EF4-FFF2-40B4-BE49-F238E27FC236}">
+                <a16:creationId xmlns:a16="http://schemas.microsoft.com/office/drawing/2014/main" id="{7D6839E6-EE34-4A7B-B888-1AEBE0227FF9}"/>
+              </a:ext>
+            </a:extLst>
+          </p:cNvPr>
+          <p:cNvPicPr>
+            <a:picLocks noChangeAspect="1"/>
+          </p:cNvPicPr>
+          <p:nvPr/>
+        </p:nvPicPr>
+        <p:blipFill>
+          <a:blip r:embed="rId3">
+            <a:extLst>
+              <a:ext uri="{BEBA8EAE-BF5A-486C-A8C5-ECC9F3942E4B}">
+                <a14:imgProps xmlns:a14="http://schemas.microsoft.com/office/drawing/2010/main">
+                  <a14:imgLayer r:embed="rId4">
+                    <a14:imgEffect>
+                      <a14:backgroundRemoval t="6522" b="93478" l="7500" r="92500">
+                        <a14:foregroundMark x1="41250" y1="82609" x2="41250" y2="82609"/>
+                        <a14:foregroundMark x1="42500" y1="89130" x2="41250" y2="92391"/>
+                        <a14:foregroundMark x1="32000" y1="89130" x2="40000" y2="93478"/>
+                        <a14:foregroundMark x1="30000" y1="88043" x2="32000" y2="89130"/>
+                        <a14:foregroundMark x1="82500" y1="81522" x2="86250" y2="81522"/>
+                        <a14:foregroundMark x1="78750" y1="52174" x2="80000" y2="48913"/>
+                        <a14:foregroundMark x1="92500" y1="21739" x2="92500" y2="18478"/>
+                        <a14:foregroundMark x1="57500" y1="7609" x2="8750" y2="42391"/>
+                        <a14:foregroundMark x1="8750" y1="42391" x2="7500" y2="66304"/>
+                        <a14:foregroundMark x1="7500" y1="7609" x2="56250" y2="6522"/>
+                        <a14:foregroundMark x1="82082" y1="86957" x2="78750" y2="89130"/>
+                        <a14:foregroundMark x1="83749" y1="85870" x2="82082" y2="86957"/>
+                        <a14:foregroundMark x1="88750" y1="82609" x2="86142" y2="84310"/>
+                        <a14:foregroundMark x1="88751" y1="89130" x2="92500" y2="86957"/>
+                        <a14:foregroundMark x1="86876" y1="90217" x2="88751" y2="89130"/>
+                        <a14:foregroundMark x1="81250" y1="93478" x2="86876" y2="90217"/>
+                        <a14:foregroundMark x1="88750" y1="91304" x2="88750" y2="91304"/>
+                        <a14:foregroundMark x1="90000" y1="90217" x2="88750" y2="92391"/>
+                        <a14:backgroundMark x1="37500" y1="88043" x2="37500" y2="88043"/>
+                        <a14:backgroundMark x1="36250" y1="89130" x2="36250" y2="89130"/>
+                        <a14:backgroundMark x1="33750" y1="89130" x2="33750" y2="89130"/>
+                        <a14:backgroundMark x1="85000" y1="86957" x2="85000" y2="86957"/>
+                        <a14:backgroundMark x1="86250" y1="85870" x2="86250" y2="85870"/>
+                        <a14:backgroundMark x1="85000" y1="85870" x2="86250" y2="86957"/>
+                        <a14:backgroundMark x1="83750" y1="86957" x2="83750" y2="86957"/>
+                        <a14:backgroundMark x1="83750" y1="85870" x2="85000" y2="85870"/>
+                        <a14:backgroundMark x1="85000" y1="84783" x2="85000" y2="84783"/>
+                        <a14:backgroundMark x1="82500" y1="86957" x2="82500" y2="86957"/>
+                        <a14:backgroundMark x1="86250" y1="89130" x2="86250" y2="89130"/>
+                        <a14:backgroundMark x1="85000" y1="90217" x2="85000" y2="90217"/>
+                      </a14:backgroundRemoval>
+                    </a14:imgEffect>
+                  </a14:imgLayer>
+                </a14:imgProps>
+              </a:ext>
+            </a:extLst>
+          </a:blip>
+          <a:stretch>
+            <a:fillRect/>
+          </a:stretch>
+        </p:blipFill>
+        <p:spPr>
+          <a:xfrm>
+            <a:off x="4344980" y="1074371"/>
+            <a:ext cx="761908" cy="876194"/>
+          </a:xfrm>
+          <a:prstGeom prst="rect">
+            <a:avLst/>
+          </a:prstGeom>
+          <a:effectLst>
+            <a:outerShdw blurRad="50800" dist="38100" dir="2700000" algn="tl" rotWithShape="0">
+              <a:prstClr val="black">
+                <a:alpha val="40000"/>
+              </a:prstClr>
+            </a:outerShdw>
+          </a:effectLst>
+        </p:spPr>
+      </p:pic>
+      <p:sp>
+        <p:nvSpPr>
+          <p:cNvPr id="53" name="Rectangle 52">
+            <a:extLst>
+              <a:ext uri="{FF2B5EF4-FFF2-40B4-BE49-F238E27FC236}">
+                <a16:creationId xmlns:a16="http://schemas.microsoft.com/office/drawing/2014/main" id="{ADF0BEC4-2BFB-4572-B0BF-7FC33A5DEB1A}"/>
+              </a:ext>
+            </a:extLst>
+          </p:cNvPr>
+          <p:cNvSpPr/>
+          <p:nvPr/>
+        </p:nvSpPr>
+        <p:spPr>
+          <a:xfrm>
+            <a:off x="6125485" y="2171276"/>
+            <a:ext cx="1317500" cy="3727062"/>
+          </a:xfrm>
+          <a:prstGeom prst="rect">
+            <a:avLst/>
+          </a:prstGeom>
+          <a:solidFill>
+            <a:schemeClr val="accent1">
+              <a:lumMod val="20000"/>
+              <a:lumOff val="80000"/>
+            </a:schemeClr>
+          </a:solidFill>
+          <a:ln w="12700" cap="flat" cmpd="sng" algn="ctr">
+            <a:solidFill>
+              <a:srgbClr val="4472C4">
+                <a:shade val="50000"/>
+              </a:srgbClr>
+            </a:solidFill>
+            <a:prstDash val="solid"/>
+            <a:miter lim="800000"/>
+          </a:ln>
+          <a:effectLst/>
+        </p:spPr>
+        <p:txBody>
+          <a:bodyPr rtlCol="0" anchor="t"/>
+          <a:lstStyle/>
+          <a:p>
+            <a:pPr marL="0" marR="0" lvl="0" indent="0" algn="ctr" defTabSz="914400" rtl="0" eaLnBrk="1" fontAlgn="auto" latinLnBrk="0" hangingPunct="1">
+              <a:lnSpc>
+                <a:spcPct val="100000"/>
+              </a:lnSpc>
+              <a:spcBef>
+                <a:spcPts val="0"/>
+              </a:spcBef>
+              <a:spcAft>
+                <a:spcPts val="0"/>
+              </a:spcAft>
+              <a:buClrTx/>
+              <a:buSzTx/>
+              <a:buFontTx/>
+              <a:buNone/>
+              <a:tabLst/>
+              <a:defRPr/>
+            </a:pPr>
+            <a:r>
+              <a:rPr kumimoji="0" lang="en-AU" sz="1400" b="0" i="0" u="none" strike="noStrike" kern="0" cap="none" spc="0" normalizeH="0" baseline="0" noProof="0" dirty="0">
+                <a:ln>
+                  <a:noFill/>
+                </a:ln>
+                <a:solidFill>
+                  <a:prstClr val="black"/>
+                </a:solidFill>
+                <a:effectLst/>
+                <a:uLnTx/>
+                <a:uFillTx/>
+                <a:latin typeface="Calibri" panose="020F0502020204030204" pitchFamily="34" charset="0"/>
+                <a:ea typeface="Verdana" panose="020B0604030504040204" pitchFamily="34" charset="0"/>
+                <a:cs typeface="Calibri" panose="020F0502020204030204" pitchFamily="34" charset="0"/>
+              </a:rPr>
+              <a:t>Azure Sphere</a:t>
+            </a:r>
+          </a:p>
+        </p:txBody>
+      </p:sp>
+      <p:sp>
+        <p:nvSpPr>
+          <p:cNvPr id="3" name="Rectangle 2">
+            <a:extLst>
+              <a:ext uri="{FF2B5EF4-FFF2-40B4-BE49-F238E27FC236}">
+                <a16:creationId xmlns:a16="http://schemas.microsoft.com/office/drawing/2014/main" id="{B159AFC7-CF0E-403C-B709-4F9C1488693F}"/>
+              </a:ext>
+            </a:extLst>
+          </p:cNvPr>
+          <p:cNvSpPr/>
+          <p:nvPr/>
+        </p:nvSpPr>
+        <p:spPr bwMode="auto">
+          <a:xfrm>
+            <a:off x="6181043" y="2443349"/>
+            <a:ext cx="1227854" cy="3383290"/>
+          </a:xfrm>
+          <a:prstGeom prst="rect">
+            <a:avLst/>
+          </a:prstGeom>
+          <a:solidFill>
+            <a:srgbClr val="008AF2"/>
+          </a:solidFill>
+          <a:ln>
+            <a:noFill/>
+            <a:headEnd type="none" w="med" len="med"/>
+            <a:tailEnd type="none" w="med" len="med"/>
+          </a:ln>
+          <a:effectLst/>
+        </p:spPr>
+        <p:style>
+          <a:lnRef idx="1">
+            <a:schemeClr val="accent2"/>
+          </a:lnRef>
+          <a:fillRef idx="3">
+            <a:schemeClr val="accent2"/>
+          </a:fillRef>
+          <a:effectRef idx="2">
+            <a:schemeClr val="accent2"/>
+          </a:effectRef>
+          <a:fontRef idx="minor">
+            <a:schemeClr val="lt1"/>
+          </a:fontRef>
+        </p:style>
+        <p:txBody>
+          <a:bodyPr rot="0" spcFirstLastPara="0" vertOverflow="overflow" horzOverflow="overflow" vert="horz" wrap="square" lIns="182880" tIns="146304" rIns="182880" bIns="146304" numCol="1" spcCol="0" rtlCol="0" fromWordArt="0" anchor="t" anchorCtr="0" forceAA="0" compatLnSpc="1">
+            <a:prstTxWarp prst="textNoShape">
+              <a:avLst/>
+            </a:prstTxWarp>
+            <a:noAutofit/>
+          </a:bodyPr>
+          <a:lstStyle/>
+          <a:p>
+            <a:pPr marL="0" marR="0" lvl="0" indent="0" algn="ctr" defTabSz="932472" rtl="0" eaLnBrk="1" fontAlgn="base" latinLnBrk="0" hangingPunct="1">
+              <a:lnSpc>
+                <a:spcPct val="100000"/>
+              </a:lnSpc>
+              <a:spcBef>
+                <a:spcPct val="0"/>
+              </a:spcBef>
+              <a:spcAft>
+                <a:spcPct val="0"/>
+              </a:spcAft>
+              <a:buClrTx/>
+              <a:buSzTx/>
+              <a:buFontTx/>
+              <a:buNone/>
+              <a:tabLst/>
+              <a:defRPr/>
+            </a:pPr>
+            <a:r>
+              <a:rPr kumimoji="0" lang="en-AU" sz="1600" b="0" i="0" u="none" strike="noStrike" kern="1200" cap="none" spc="0" normalizeH="0" baseline="0" noProof="0" dirty="0">
+                <a:ln>
+                  <a:noFill/>
+                </a:ln>
+                <a:solidFill>
+                  <a:srgbClr val="FFFFFF"/>
+                </a:solidFill>
+                <a:effectLst/>
+                <a:uLnTx/>
+                <a:uFillTx/>
+                <a:latin typeface="Calibri" panose="020F0502020204030204" pitchFamily="34" charset="0"/>
+                <a:ea typeface="Segoe UI" pitchFamily="34" charset="0"/>
+                <a:cs typeface="Calibri" panose="020F0502020204030204" pitchFamily="34" charset="0"/>
+              </a:rPr>
+              <a:t>Cortex A7 High-level</a:t>
+            </a:r>
+          </a:p>
+        </p:txBody>
+      </p:sp>
+      <p:pic>
+        <p:nvPicPr>
+          <p:cNvPr id="98" name="Picture 97">
+            <a:extLst>
+              <a:ext uri="{FF2B5EF4-FFF2-40B4-BE49-F238E27FC236}">
+                <a16:creationId xmlns:a16="http://schemas.microsoft.com/office/drawing/2014/main" id="{DD649830-9C19-457C-BA09-453B6B4FB8F9}"/>
+              </a:ext>
+            </a:extLst>
+          </p:cNvPr>
+          <p:cNvPicPr>
+            <a:picLocks noChangeAspect="1" noChangeArrowheads="1"/>
+          </p:cNvPicPr>
+          <p:nvPr/>
+        </p:nvPicPr>
+        <p:blipFill>
+          <a:blip r:embed="rId5" cstate="print">
+            <a:extLst>
+              <a:ext uri="{28A0092B-C50C-407E-A947-70E740481C1C}">
+                <a14:useLocalDpi xmlns:a14="http://schemas.microsoft.com/office/drawing/2010/main" val="0"/>
+              </a:ext>
+            </a:extLst>
+          </a:blip>
+          <a:srcRect/>
+          <a:stretch>
+            <a:fillRect/>
+          </a:stretch>
+        </p:blipFill>
+        <p:spPr bwMode="auto">
+          <a:xfrm>
+            <a:off x="5974067" y="1049824"/>
+            <a:ext cx="1641805" cy="916033"/>
+          </a:xfrm>
+          <a:prstGeom prst="rect">
+            <a:avLst/>
+          </a:prstGeom>
+          <a:noFill/>
+          <a:extLst>
+            <a:ext uri="{909E8E84-426E-40DD-AFC4-6F175D3DCCD1}">
+              <a14:hiddenFill xmlns:a14="http://schemas.microsoft.com/office/drawing/2010/main">
+                <a:solidFill>
+                  <a:srgbClr val="FFFFFF"/>
+                </a:solidFill>
+              </a14:hiddenFill>
+            </a:ext>
+          </a:extLst>
+        </p:spPr>
+      </p:pic>
+      <p:sp>
+        <p:nvSpPr>
+          <p:cNvPr id="30" name="Rectangle 29">
+            <a:extLst>
+              <a:ext uri="{FF2B5EF4-FFF2-40B4-BE49-F238E27FC236}">
+                <a16:creationId xmlns:a16="http://schemas.microsoft.com/office/drawing/2014/main" id="{0531FC31-631D-4B66-86B9-9E42BB3D5C46}"/>
+              </a:ext>
+            </a:extLst>
+          </p:cNvPr>
+          <p:cNvSpPr/>
+          <p:nvPr/>
+        </p:nvSpPr>
+        <p:spPr>
+          <a:xfrm>
+            <a:off x="1754163" y="2171276"/>
+            <a:ext cx="1584817" cy="3727062"/>
+          </a:xfrm>
+          <a:prstGeom prst="rect">
+            <a:avLst/>
+          </a:prstGeom>
+          <a:solidFill>
+            <a:schemeClr val="accent1">
+              <a:lumMod val="60000"/>
+              <a:lumOff val="40000"/>
+            </a:schemeClr>
+          </a:solidFill>
+          <a:ln w="12700" cap="flat" cmpd="sng" algn="ctr">
+            <a:solidFill>
+              <a:srgbClr val="4472C4">
+                <a:shade val="50000"/>
+              </a:srgbClr>
+            </a:solidFill>
+            <a:prstDash val="solid"/>
+            <a:miter lim="800000"/>
+          </a:ln>
+          <a:effectLst/>
+        </p:spPr>
+        <p:txBody>
+          <a:bodyPr rtlCol="0" anchor="t"/>
+          <a:lstStyle/>
+          <a:p>
+            <a:pPr marL="0" marR="0" lvl="0" indent="0" algn="ctr" defTabSz="914400" rtl="0" eaLnBrk="1" fontAlgn="auto" latinLnBrk="0" hangingPunct="1">
+              <a:lnSpc>
+                <a:spcPct val="100000"/>
+              </a:lnSpc>
+              <a:spcBef>
+                <a:spcPts val="0"/>
+              </a:spcBef>
+              <a:spcAft>
+                <a:spcPts val="0"/>
+              </a:spcAft>
+              <a:buClrTx/>
+              <a:buSzTx/>
+              <a:buFontTx/>
+              <a:buNone/>
+              <a:tabLst/>
+              <a:defRPr/>
+            </a:pPr>
+            <a:r>
+              <a:rPr kumimoji="0" lang="en-AU" sz="1400" b="0" i="0" u="none" strike="noStrike" kern="0" cap="none" spc="0" normalizeH="0" baseline="0" noProof="0" dirty="0">
+                <a:ln>
+                  <a:noFill/>
+                </a:ln>
+                <a:solidFill>
+                  <a:prstClr val="black"/>
+                </a:solidFill>
+                <a:effectLst/>
+                <a:uLnTx/>
+                <a:uFillTx/>
+                <a:latin typeface="Calibri" panose="020F0502020204030204" pitchFamily="34" charset="0"/>
+                <a:ea typeface="Verdana" panose="020B0604030504040204" pitchFamily="34" charset="0"/>
+                <a:cs typeface="Calibri" panose="020F0502020204030204" pitchFamily="34" charset="0"/>
+              </a:rPr>
+              <a:t>Azure IoT Central</a:t>
+            </a:r>
+          </a:p>
+        </p:txBody>
+      </p:sp>
+      <p:sp>
+        <p:nvSpPr>
+          <p:cNvPr id="31" name="Rectangle 30">
+            <a:extLst>
+              <a:ext uri="{FF2B5EF4-FFF2-40B4-BE49-F238E27FC236}">
+                <a16:creationId xmlns:a16="http://schemas.microsoft.com/office/drawing/2014/main" id="{BD21EC29-56BF-438B-8C00-B8C59EA309D1}"/>
+              </a:ext>
+            </a:extLst>
+          </p:cNvPr>
+          <p:cNvSpPr/>
+          <p:nvPr/>
+        </p:nvSpPr>
+        <p:spPr>
+          <a:xfrm>
+            <a:off x="1925247" y="2841451"/>
+            <a:ext cx="1242647" cy="2600584"/>
+          </a:xfrm>
+          <a:prstGeom prst="rect">
+            <a:avLst/>
+          </a:prstGeom>
+          <a:solidFill>
+            <a:srgbClr val="FFD44B"/>
+          </a:solidFill>
+          <a:ln w="12700" cap="flat" cmpd="sng" algn="ctr">
+            <a:solidFill>
+              <a:srgbClr val="4472C4">
+                <a:shade val="50000"/>
+              </a:srgbClr>
+            </a:solidFill>
+            <a:prstDash val="solid"/>
+            <a:miter lim="800000"/>
+          </a:ln>
+          <a:effectLst/>
+        </p:spPr>
+        <p:txBody>
+          <a:bodyPr rtlCol="0" anchor="ctr"/>
+          <a:lstStyle/>
+          <a:p>
+            <a:pPr marL="0" marR="0" lvl="0" indent="0" algn="ctr" defTabSz="914400" rtl="0" eaLnBrk="1" fontAlgn="auto" latinLnBrk="0" hangingPunct="1">
+              <a:lnSpc>
+                <a:spcPct val="100000"/>
+              </a:lnSpc>
+              <a:spcBef>
+                <a:spcPts val="0"/>
+              </a:spcBef>
+              <a:spcAft>
+                <a:spcPts val="0"/>
+              </a:spcAft>
+              <a:buClrTx/>
+              <a:buSzTx/>
+              <a:buFontTx/>
+              <a:buNone/>
+              <a:tabLst/>
+              <a:defRPr/>
+            </a:pPr>
+            <a:endParaRPr kumimoji="0" lang="en-AU" sz="1100" b="0" i="0" u="none" strike="noStrike" kern="0" cap="none" spc="0" normalizeH="0" baseline="0" noProof="0" dirty="0">
+              <a:ln>
+                <a:noFill/>
+              </a:ln>
+              <a:solidFill>
+                <a:prstClr val="black"/>
+              </a:solidFill>
+              <a:effectLst/>
+              <a:uLnTx/>
+              <a:uFillTx/>
+              <a:latin typeface="Calibri" panose="020F0502020204030204" pitchFamily="34" charset="0"/>
+              <a:ea typeface="Verdana" panose="020B0604030504040204" pitchFamily="34" charset="0"/>
+              <a:cs typeface="Calibri" panose="020F0502020204030204" pitchFamily="34" charset="0"/>
+            </a:endParaRPr>
+          </a:p>
+        </p:txBody>
+      </p:sp>
+      <p:pic>
+        <p:nvPicPr>
+          <p:cNvPr id="36" name="Picture 2" descr="See the source image">
+            <a:extLst>
+              <a:ext uri="{FF2B5EF4-FFF2-40B4-BE49-F238E27FC236}">
+                <a16:creationId xmlns:a16="http://schemas.microsoft.com/office/drawing/2014/main" id="{48502AAD-15D2-4F15-955A-3704EAB325E5}"/>
+              </a:ext>
+            </a:extLst>
+          </p:cNvPr>
+          <p:cNvPicPr>
+            <a:picLocks noChangeAspect="1" noChangeArrowheads="1"/>
+          </p:cNvPicPr>
+          <p:nvPr/>
+        </p:nvPicPr>
+        <p:blipFill>
+          <a:blip r:embed="rId6" cstate="print">
+            <a:extLst>
+              <a:ext uri="{BEBA8EAE-BF5A-486C-A8C5-ECC9F3942E4B}">
+                <a14:imgProps xmlns:a14="http://schemas.microsoft.com/office/drawing/2010/main">
+                  <a14:imgLayer r:embed="rId7">
+                    <a14:imgEffect>
+                      <a14:backgroundRemoval t="3125" b="96307" l="3797" r="94304">
+                        <a14:foregroundMark x1="28797" y1="16761" x2="28797" y2="16761"/>
+                        <a14:foregroundMark x1="6646" y1="35227" x2="6646" y2="35227"/>
+                        <a14:foregroundMark x1="51266" y1="4545" x2="51266" y2="4545"/>
+                        <a14:foregroundMark x1="94620" y1="41761" x2="94620" y2="41761"/>
+                        <a14:foregroundMark x1="48418" y1="96307" x2="48418" y2="96307"/>
+                        <a14:foregroundMark x1="4747" y1="70170" x2="4747" y2="70170"/>
+                        <a14:foregroundMark x1="4114" y1="34091" x2="4114" y2="34091"/>
+                        <a14:foregroundMark x1="3797" y1="68182" x2="3797" y2="68182"/>
+                        <a14:foregroundMark x1="53797" y1="49432" x2="53797" y2="49432"/>
+                      </a14:backgroundRemoval>
+                    </a14:imgEffect>
+                  </a14:imgLayer>
+                </a14:imgProps>
+              </a:ext>
+              <a:ext uri="{28A0092B-C50C-407E-A947-70E740481C1C}">
+                <a14:useLocalDpi xmlns:a14="http://schemas.microsoft.com/office/drawing/2010/main" val="0"/>
+              </a:ext>
+            </a:extLst>
+          </a:blip>
+          <a:srcRect/>
+          <a:stretch>
+            <a:fillRect/>
+          </a:stretch>
+        </p:blipFill>
+        <p:spPr bwMode="auto">
+          <a:xfrm>
+            <a:off x="2127587" y="1045753"/>
+            <a:ext cx="837966" cy="933430"/>
+          </a:xfrm>
+          <a:prstGeom prst="rect">
+            <a:avLst/>
+          </a:prstGeom>
+          <a:noFill/>
+          <a:effectLst>
+            <a:outerShdw blurRad="50800" dist="38100" dir="2700000" algn="tl" rotWithShape="0">
+              <a:prstClr val="black">
+                <a:alpha val="40000"/>
+              </a:prstClr>
+            </a:outerShdw>
+          </a:effectLst>
+          <a:extLst>
+            <a:ext uri="{909E8E84-426E-40DD-AFC4-6F175D3DCCD1}">
+              <a14:hiddenFill xmlns:a14="http://schemas.microsoft.com/office/drawing/2010/main">
+                <a:solidFill>
+                  <a:srgbClr val="FFFFFF"/>
+                </a:solidFill>
+              </a14:hiddenFill>
+            </a:ext>
+          </a:extLst>
+        </p:spPr>
+      </p:pic>
+      <p:sp>
+        <p:nvSpPr>
+          <p:cNvPr id="37" name="Oval 36">
+            <a:extLst>
+              <a:ext uri="{FF2B5EF4-FFF2-40B4-BE49-F238E27FC236}">
+                <a16:creationId xmlns:a16="http://schemas.microsoft.com/office/drawing/2014/main" id="{C4704B70-6D45-413E-A194-E21001C7378F}"/>
+              </a:ext>
+            </a:extLst>
+          </p:cNvPr>
+          <p:cNvSpPr/>
+          <p:nvPr/>
+        </p:nvSpPr>
+        <p:spPr>
+          <a:xfrm>
+            <a:off x="3028306" y="2728639"/>
+            <a:ext cx="256674" cy="248652"/>
+          </a:xfrm>
+          <a:prstGeom prst="ellipse">
+            <a:avLst/>
+          </a:prstGeom>
+          <a:solidFill>
+            <a:srgbClr val="5B9BD5">
+              <a:lumMod val="75000"/>
+            </a:srgbClr>
+          </a:solidFill>
+          <a:ln w="12700" cap="flat" cmpd="sng" algn="ctr">
+            <a:solidFill>
+              <a:srgbClr val="4472C4">
+                <a:shade val="50000"/>
+              </a:srgbClr>
+            </a:solidFill>
+            <a:prstDash val="solid"/>
+            <a:miter lim="800000"/>
+          </a:ln>
+          <a:effectLst/>
+        </p:spPr>
+        <p:txBody>
+          <a:bodyPr rtlCol="0" anchor="ctr"/>
+          <a:lstStyle/>
+          <a:p>
+            <a:pPr marL="0" marR="0" lvl="0" indent="0" algn="ctr" defTabSz="914400" rtl="0" eaLnBrk="1" fontAlgn="auto" latinLnBrk="0" hangingPunct="1">
+              <a:lnSpc>
+                <a:spcPct val="100000"/>
+              </a:lnSpc>
+              <a:spcBef>
+                <a:spcPts val="0"/>
+              </a:spcBef>
+              <a:spcAft>
+                <a:spcPts val="0"/>
+              </a:spcAft>
+              <a:buClrTx/>
+              <a:buSzTx/>
+              <a:buFontTx/>
+              <a:buNone/>
+              <a:tabLst/>
+              <a:defRPr/>
+            </a:pPr>
+            <a:r>
+              <a:rPr kumimoji="0" lang="en-AU" sz="1100" b="0" i="0" u="none" strike="noStrike" kern="0" cap="none" spc="0" normalizeH="0" baseline="0" noProof="0">
+                <a:ln>
+                  <a:noFill/>
+                </a:ln>
+                <a:solidFill>
+                  <a:prstClr val="white"/>
+                </a:solidFill>
+                <a:effectLst/>
+                <a:uLnTx/>
+                <a:uFillTx/>
+                <a:latin typeface="Calibri" panose="020F0502020204030204" pitchFamily="34" charset="0"/>
+                <a:ea typeface="Verdana" panose="020B0604030504040204" pitchFamily="34" charset="0"/>
+                <a:cs typeface="Calibri" panose="020F0502020204030204" pitchFamily="34" charset="0"/>
+              </a:rPr>
+              <a:t>1</a:t>
+            </a:r>
+          </a:p>
+        </p:txBody>
+      </p:sp>
+      <p:sp>
+        <p:nvSpPr>
+          <p:cNvPr id="76" name="Oval 75">
+            <a:extLst>
+              <a:ext uri="{FF2B5EF4-FFF2-40B4-BE49-F238E27FC236}">
+                <a16:creationId xmlns:a16="http://schemas.microsoft.com/office/drawing/2014/main" id="{FA171BA4-28A3-4DEF-94E1-2C6806F8D72A}"/>
+              </a:ext>
+            </a:extLst>
+          </p:cNvPr>
+          <p:cNvSpPr/>
+          <p:nvPr/>
+        </p:nvSpPr>
+        <p:spPr>
+          <a:xfrm>
+            <a:off x="3028306" y="5311230"/>
+            <a:ext cx="256674" cy="248652"/>
+          </a:xfrm>
+          <a:prstGeom prst="ellipse">
+            <a:avLst/>
+          </a:prstGeom>
+          <a:solidFill>
+            <a:srgbClr val="5B9BD5">
+              <a:lumMod val="75000"/>
+            </a:srgbClr>
+          </a:solidFill>
+          <a:ln w="12700" cap="flat" cmpd="sng" algn="ctr">
+            <a:solidFill>
+              <a:srgbClr val="4472C4">
+                <a:shade val="50000"/>
+              </a:srgbClr>
+            </a:solidFill>
+            <a:prstDash val="solid"/>
+            <a:miter lim="800000"/>
+          </a:ln>
+          <a:effectLst/>
+        </p:spPr>
+        <p:txBody>
+          <a:bodyPr rtlCol="0" anchor="ctr"/>
+          <a:lstStyle/>
+          <a:p>
+            <a:pPr marL="0" marR="0" lvl="0" indent="0" algn="ctr" defTabSz="914400" rtl="0" eaLnBrk="1" fontAlgn="auto" latinLnBrk="0" hangingPunct="1">
+              <a:lnSpc>
+                <a:spcPct val="100000"/>
+              </a:lnSpc>
+              <a:spcBef>
+                <a:spcPts val="0"/>
+              </a:spcBef>
+              <a:spcAft>
+                <a:spcPts val="0"/>
+              </a:spcAft>
+              <a:buClrTx/>
+              <a:buSzTx/>
+              <a:buFontTx/>
+              <a:buNone/>
+              <a:tabLst/>
+              <a:defRPr/>
+            </a:pPr>
+            <a:r>
+              <a:rPr kumimoji="0" lang="en-AU" sz="1100" b="0" i="0" u="none" strike="noStrike" kern="0" cap="none" spc="0" normalizeH="0" baseline="0" noProof="0">
+                <a:ln>
+                  <a:noFill/>
+                </a:ln>
+                <a:solidFill>
+                  <a:prstClr val="white"/>
+                </a:solidFill>
+                <a:effectLst/>
+                <a:uLnTx/>
+                <a:uFillTx/>
+                <a:latin typeface="Calibri" panose="020F0502020204030204" pitchFamily="34" charset="0"/>
+                <a:ea typeface="Verdana" panose="020B0604030504040204" pitchFamily="34" charset="0"/>
+                <a:cs typeface="Calibri" panose="020F0502020204030204" pitchFamily="34" charset="0"/>
+              </a:rPr>
+              <a:t>6</a:t>
+            </a:r>
+          </a:p>
+        </p:txBody>
+      </p:sp>
+      <p:cxnSp>
+        <p:nvCxnSpPr>
+          <p:cNvPr id="32" name="Straight Arrow Connector 31">
+            <a:extLst>
+              <a:ext uri="{FF2B5EF4-FFF2-40B4-BE49-F238E27FC236}">
+                <a16:creationId xmlns:a16="http://schemas.microsoft.com/office/drawing/2014/main" id="{3B81D555-A38B-44F0-825D-1DADC884AFAE}"/>
+              </a:ext>
+            </a:extLst>
+          </p:cNvPr>
+          <p:cNvCxnSpPr>
+            <a:cxnSpLocks/>
+          </p:cNvCxnSpPr>
+          <p:nvPr/>
+        </p:nvCxnSpPr>
+        <p:spPr>
+          <a:xfrm flipH="1">
+            <a:off x="3175197" y="3561078"/>
+            <a:ext cx="929458" cy="0"/>
+          </a:xfrm>
+          <a:prstGeom prst="straightConnector1">
+            <a:avLst/>
+          </a:prstGeom>
+          <a:noFill/>
+          <a:ln w="38100" cap="flat" cmpd="sng" algn="ctr">
+            <a:solidFill>
+              <a:srgbClr val="4472C4"/>
+            </a:solidFill>
+            <a:prstDash val="solid"/>
+            <a:miter lim="800000"/>
+            <a:headEnd type="triangle" w="med" len="med"/>
+            <a:tailEnd type="triangle" w="med" len="med"/>
+          </a:ln>
+          <a:effectLst/>
+        </p:spPr>
+      </p:cxnSp>
+      <p:cxnSp>
+        <p:nvCxnSpPr>
+          <p:cNvPr id="75" name="Straight Arrow Connector 74">
+            <a:extLst>
+              <a:ext uri="{FF2B5EF4-FFF2-40B4-BE49-F238E27FC236}">
+                <a16:creationId xmlns:a16="http://schemas.microsoft.com/office/drawing/2014/main" id="{85EAF4E5-0BAB-48FB-8EA9-CF9901AA3326}"/>
+              </a:ext>
+            </a:extLst>
+          </p:cNvPr>
+          <p:cNvCxnSpPr>
+            <a:cxnSpLocks/>
+            <a:endCxn id="70" idx="1"/>
+          </p:cNvCxnSpPr>
+          <p:nvPr/>
+        </p:nvCxnSpPr>
+        <p:spPr>
+          <a:xfrm>
+            <a:off x="3167894" y="5044493"/>
+            <a:ext cx="919894" cy="0"/>
+          </a:xfrm>
+          <a:prstGeom prst="straightConnector1">
+            <a:avLst/>
+          </a:prstGeom>
+          <a:noFill/>
+          <a:ln w="38100" cap="flat" cmpd="sng" algn="ctr">
+            <a:solidFill>
+              <a:srgbClr val="4472C4"/>
+            </a:solidFill>
+            <a:prstDash val="solid"/>
+            <a:miter lim="800000"/>
+            <a:headEnd type="triangle" w="med" len="med"/>
+            <a:tailEnd type="triangle" w="med" len="med"/>
+          </a:ln>
+          <a:effectLst/>
+        </p:spPr>
+      </p:cxnSp>
+      <p:sp>
+        <p:nvSpPr>
+          <p:cNvPr id="2" name="Oval 1">
+            <a:extLst>
+              <a:ext uri="{FF2B5EF4-FFF2-40B4-BE49-F238E27FC236}">
+                <a16:creationId xmlns:a16="http://schemas.microsoft.com/office/drawing/2014/main" id="{E55674D5-44EE-4A41-8F7B-2546F1ED6E34}"/>
+              </a:ext>
+            </a:extLst>
+          </p:cNvPr>
+          <p:cNvSpPr/>
+          <p:nvPr/>
+        </p:nvSpPr>
+        <p:spPr>
+          <a:xfrm>
+            <a:off x="5694329" y="3454724"/>
+            <a:ext cx="256674" cy="248652"/>
+          </a:xfrm>
+          <a:prstGeom prst="ellipse">
+            <a:avLst/>
+          </a:prstGeom>
+          <a:solidFill>
+            <a:srgbClr val="5B9BD5">
+              <a:lumMod val="75000"/>
+            </a:srgbClr>
+          </a:solidFill>
+          <a:ln w="12700" cap="flat" cmpd="sng" algn="ctr">
+            <a:solidFill>
+              <a:srgbClr val="4472C4">
+                <a:shade val="50000"/>
+              </a:srgbClr>
+            </a:solidFill>
+            <a:prstDash val="solid"/>
+            <a:miter lim="800000"/>
+          </a:ln>
+          <a:effectLst/>
+        </p:spPr>
+        <p:txBody>
+          <a:bodyPr rtlCol="0" anchor="ctr"/>
+          <a:lstStyle/>
+          <a:p>
+            <a:pPr marL="0" marR="0" lvl="0" indent="0" algn="ctr" defTabSz="914400" rtl="0" eaLnBrk="1" fontAlgn="auto" latinLnBrk="0" hangingPunct="1">
+              <a:lnSpc>
+                <a:spcPct val="100000"/>
+              </a:lnSpc>
+              <a:spcBef>
+                <a:spcPts val="0"/>
+              </a:spcBef>
+              <a:spcAft>
+                <a:spcPts val="0"/>
+              </a:spcAft>
+              <a:buClrTx/>
+              <a:buSzTx/>
+              <a:buFontTx/>
+              <a:buNone/>
+              <a:tabLst/>
+              <a:defRPr/>
+            </a:pPr>
+            <a:r>
+              <a:rPr kumimoji="0" lang="en-AU" sz="1100" b="0" i="0" u="none" strike="noStrike" kern="0" cap="none" spc="0" normalizeH="0" baseline="0" noProof="0" dirty="0">
+                <a:ln>
+                  <a:noFill/>
+                </a:ln>
+                <a:solidFill>
+                  <a:prstClr val="white"/>
+                </a:solidFill>
+                <a:effectLst/>
+                <a:uLnTx/>
+                <a:uFillTx/>
+                <a:latin typeface="Calibri" panose="020F0502020204030204" pitchFamily="34" charset="0"/>
+                <a:ea typeface="Verdana" panose="020B0604030504040204" pitchFamily="34" charset="0"/>
+                <a:cs typeface="Calibri" panose="020F0502020204030204" pitchFamily="34" charset="0"/>
+              </a:rPr>
+              <a:t>2</a:t>
+            </a:r>
+          </a:p>
+        </p:txBody>
+      </p:sp>
+      <p:sp>
+        <p:nvSpPr>
+          <p:cNvPr id="16" name="Rectangle 15">
+            <a:extLst>
+              <a:ext uri="{FF2B5EF4-FFF2-40B4-BE49-F238E27FC236}">
+                <a16:creationId xmlns:a16="http://schemas.microsoft.com/office/drawing/2014/main" id="{F9FBFEF7-DEAF-4F8B-B44D-058BEE0CFFEB}"/>
+              </a:ext>
+            </a:extLst>
+          </p:cNvPr>
+          <p:cNvSpPr/>
+          <p:nvPr/>
+        </p:nvSpPr>
+        <p:spPr>
+          <a:xfrm>
+            <a:off x="6277516" y="3280704"/>
+            <a:ext cx="1018773" cy="978613"/>
+          </a:xfrm>
+          <a:prstGeom prst="rect">
+            <a:avLst/>
+          </a:prstGeom>
+          <a:solidFill>
+            <a:srgbClr val="FFD44B"/>
+          </a:solidFill>
+          <a:ln w="12700" cap="flat" cmpd="sng" algn="ctr">
+            <a:solidFill>
+              <a:srgbClr val="4472C4">
+                <a:shade val="50000"/>
+              </a:srgbClr>
+            </a:solidFill>
+            <a:prstDash val="solid"/>
+            <a:miter lim="800000"/>
+          </a:ln>
+          <a:effectLst/>
+        </p:spPr>
+        <p:txBody>
+          <a:bodyPr rtlCol="0" anchor="ctr"/>
+          <a:lstStyle/>
+          <a:p>
+            <a:pPr marL="0" marR="0" lvl="0" indent="0" algn="ctr" defTabSz="914400" rtl="0" eaLnBrk="1" fontAlgn="auto" latinLnBrk="0" hangingPunct="1">
+              <a:lnSpc>
+                <a:spcPct val="100000"/>
+              </a:lnSpc>
+              <a:spcBef>
+                <a:spcPts val="0"/>
+              </a:spcBef>
+              <a:spcAft>
+                <a:spcPts val="0"/>
+              </a:spcAft>
+              <a:buClrTx/>
+              <a:buSzTx/>
+              <a:buFontTx/>
+              <a:buNone/>
+              <a:tabLst/>
+              <a:defRPr/>
+            </a:pPr>
+            <a:r>
+              <a:rPr kumimoji="0" lang="en-AU" sz="1200" b="0" i="0" u="none" strike="noStrike" kern="0" cap="none" spc="0" normalizeH="0" baseline="0" noProof="0" dirty="0">
+                <a:ln>
+                  <a:noFill/>
+                </a:ln>
+                <a:solidFill>
+                  <a:srgbClr val="000000"/>
+                </a:solidFill>
+                <a:effectLst/>
+                <a:uLnTx/>
+                <a:uFillTx/>
+                <a:latin typeface="Calibri" panose="020F0502020204030204" pitchFamily="34" charset="0"/>
+                <a:ea typeface="Verdana" panose="020B0604030504040204" pitchFamily="34" charset="0"/>
+                <a:cs typeface="Calibri" panose="020F0502020204030204" pitchFamily="34" charset="0"/>
+              </a:rPr>
+              <a:t>Telemetry streaming</a:t>
+            </a:r>
+          </a:p>
+        </p:txBody>
+      </p:sp>
+      <p:cxnSp>
+        <p:nvCxnSpPr>
+          <p:cNvPr id="66" name="Straight Arrow Connector 65">
+            <a:extLst>
+              <a:ext uri="{FF2B5EF4-FFF2-40B4-BE49-F238E27FC236}">
+                <a16:creationId xmlns:a16="http://schemas.microsoft.com/office/drawing/2014/main" id="{DC3D84F9-6383-4333-B442-308F4AB1EC7A}"/>
+              </a:ext>
+            </a:extLst>
+          </p:cNvPr>
+          <p:cNvCxnSpPr>
+            <a:cxnSpLocks/>
+          </p:cNvCxnSpPr>
+          <p:nvPr/>
+        </p:nvCxnSpPr>
+        <p:spPr>
+          <a:xfrm flipH="1">
+            <a:off x="5391385" y="3767513"/>
+            <a:ext cx="915242" cy="0"/>
+          </a:xfrm>
+          <a:prstGeom prst="straightConnector1">
+            <a:avLst/>
+          </a:prstGeom>
+          <a:noFill/>
+          <a:ln w="38100" cap="flat" cmpd="sng" algn="ctr">
+            <a:solidFill>
+              <a:srgbClr val="4472C4"/>
+            </a:solidFill>
+            <a:prstDash val="solid"/>
+            <a:miter lim="800000"/>
+            <a:tailEnd type="triangle"/>
+          </a:ln>
+          <a:effectLst/>
+        </p:spPr>
+      </p:cxnSp>
+      <p:sp>
+        <p:nvSpPr>
+          <p:cNvPr id="51" name="TextBox 50">
+            <a:extLst>
+              <a:ext uri="{FF2B5EF4-FFF2-40B4-BE49-F238E27FC236}">
+                <a16:creationId xmlns:a16="http://schemas.microsoft.com/office/drawing/2014/main" id="{382B468B-7884-4053-BF44-8A5C49ED7993}"/>
+              </a:ext>
+            </a:extLst>
+          </p:cNvPr>
+          <p:cNvSpPr txBox="1"/>
+          <p:nvPr/>
+        </p:nvSpPr>
+        <p:spPr>
+          <a:xfrm>
+            <a:off x="4175248" y="3432129"/>
+            <a:ext cx="1154162" cy="846386"/>
+          </a:xfrm>
+          <a:prstGeom prst="rect">
+            <a:avLst/>
+          </a:prstGeom>
+          <a:noFill/>
+        </p:spPr>
+        <p:txBody>
+          <a:bodyPr wrap="none" lIns="0" tIns="0" rIns="0" bIns="0" rtlCol="0">
+            <a:spAutoFit/>
+          </a:bodyPr>
+          <a:lstStyle/>
+          <a:p>
+            <a:pPr marL="0" marR="0" lvl="0" indent="0" algn="l" defTabSz="914400" rtl="0" eaLnBrk="1" fontAlgn="auto" latinLnBrk="0" hangingPunct="1">
+              <a:lnSpc>
+                <a:spcPct val="100000"/>
+              </a:lnSpc>
+              <a:spcBef>
+                <a:spcPts val="0"/>
+              </a:spcBef>
+              <a:spcAft>
+                <a:spcPts val="0"/>
+              </a:spcAft>
+              <a:buClrTx/>
+              <a:buSzTx/>
+              <a:buFontTx/>
+              <a:buNone/>
+              <a:tabLst/>
+              <a:defRPr/>
+            </a:pPr>
+            <a:r>
+              <a:rPr kumimoji="0" lang="en-AU" sz="1100" b="0" i="0" u="none" strike="noStrike" kern="1200" cap="none" spc="0" normalizeH="0" baseline="0" noProof="0" dirty="0">
+                <a:ln>
+                  <a:noFill/>
+                </a:ln>
+                <a:solidFill>
+                  <a:srgbClr val="000000"/>
+                </a:solidFill>
+                <a:effectLst/>
+                <a:uLnTx/>
+                <a:uFillTx/>
+                <a:latin typeface="Calibri" panose="020F0502020204030204" pitchFamily="34" charset="0"/>
+                <a:cs typeface="Calibri" panose="020F0502020204030204" pitchFamily="34" charset="0"/>
+              </a:rPr>
+              <a:t>{ </a:t>
+            </a:r>
+          </a:p>
+          <a:p>
+            <a:pPr marL="0" marR="0" lvl="0" indent="0" algn="l" defTabSz="914400" rtl="0" eaLnBrk="1" fontAlgn="auto" latinLnBrk="0" hangingPunct="1">
+              <a:lnSpc>
+                <a:spcPct val="100000"/>
+              </a:lnSpc>
+              <a:spcBef>
+                <a:spcPts val="0"/>
+              </a:spcBef>
+              <a:spcAft>
+                <a:spcPts val="0"/>
+              </a:spcAft>
+              <a:buClrTx/>
+              <a:buSzTx/>
+              <a:buFontTx/>
+              <a:buNone/>
+              <a:tabLst/>
+              <a:defRPr/>
+            </a:pPr>
+            <a:r>
+              <a:rPr kumimoji="0" lang="en-AU" sz="1100" b="0" i="0" u="none" strike="noStrike" kern="1200" cap="none" spc="0" normalizeH="0" baseline="0" noProof="0" dirty="0">
+                <a:ln>
+                  <a:noFill/>
+                </a:ln>
+                <a:solidFill>
+                  <a:srgbClr val="000000"/>
+                </a:solidFill>
+                <a:effectLst/>
+                <a:uLnTx/>
+                <a:uFillTx/>
+                <a:latin typeface="Calibri" panose="020F0502020204030204" pitchFamily="34" charset="0"/>
+                <a:cs typeface="Calibri" panose="020F0502020204030204" pitchFamily="34" charset="0"/>
+              </a:rPr>
+              <a:t>  “Temperature”:26,</a:t>
+            </a:r>
+          </a:p>
+          <a:p>
+            <a:pPr marL="0" marR="0" lvl="0" indent="0" algn="l" defTabSz="914400" rtl="0" eaLnBrk="1" fontAlgn="auto" latinLnBrk="0" hangingPunct="1">
+              <a:lnSpc>
+                <a:spcPct val="100000"/>
+              </a:lnSpc>
+              <a:spcBef>
+                <a:spcPts val="0"/>
+              </a:spcBef>
+              <a:spcAft>
+                <a:spcPts val="0"/>
+              </a:spcAft>
+              <a:buClrTx/>
+              <a:buSzTx/>
+              <a:buFontTx/>
+              <a:buNone/>
+              <a:tabLst/>
+              <a:defRPr/>
+            </a:pPr>
+            <a:r>
+              <a:rPr kumimoji="0" lang="en-AU" sz="1100" b="0" i="0" u="none" strike="noStrike" kern="1200" cap="none" spc="0" normalizeH="0" baseline="0" noProof="0" dirty="0">
+                <a:ln>
+                  <a:noFill/>
+                </a:ln>
+                <a:solidFill>
+                  <a:srgbClr val="000000"/>
+                </a:solidFill>
+                <a:effectLst/>
+                <a:uLnTx/>
+                <a:uFillTx/>
+                <a:latin typeface="Calibri" panose="020F0502020204030204" pitchFamily="34" charset="0"/>
+                <a:cs typeface="Calibri" panose="020F0502020204030204" pitchFamily="34" charset="0"/>
+              </a:rPr>
+              <a:t>  “Humidity”:55,</a:t>
+            </a:r>
+          </a:p>
+          <a:p>
+            <a:pPr marL="0" marR="0" lvl="0" indent="0" algn="l" defTabSz="914400" rtl="0" eaLnBrk="1" fontAlgn="auto" latinLnBrk="0" hangingPunct="1">
+              <a:lnSpc>
+                <a:spcPct val="100000"/>
+              </a:lnSpc>
+              <a:spcBef>
+                <a:spcPts val="0"/>
+              </a:spcBef>
+              <a:spcAft>
+                <a:spcPts val="0"/>
+              </a:spcAft>
+              <a:buClrTx/>
+              <a:buSzTx/>
+              <a:buFontTx/>
+              <a:buNone/>
+              <a:tabLst/>
+              <a:defRPr/>
+            </a:pPr>
+            <a:r>
+              <a:rPr kumimoji="0" lang="en-AU" sz="1100" b="0" i="0" u="none" strike="noStrike" kern="1200" cap="none" spc="0" normalizeH="0" baseline="0" noProof="0" dirty="0">
+                <a:ln>
+                  <a:noFill/>
+                </a:ln>
+                <a:solidFill>
+                  <a:srgbClr val="000000"/>
+                </a:solidFill>
+                <a:effectLst/>
+                <a:uLnTx/>
+                <a:uFillTx/>
+                <a:latin typeface="Calibri" panose="020F0502020204030204" pitchFamily="34" charset="0"/>
+                <a:cs typeface="Calibri" panose="020F0502020204030204" pitchFamily="34" charset="0"/>
+              </a:rPr>
+              <a:t>  “Pressure”: 1100</a:t>
+            </a:r>
+          </a:p>
+          <a:p>
+            <a:pPr marL="0" marR="0" lvl="0" indent="0" algn="l" defTabSz="914400" rtl="0" eaLnBrk="1" fontAlgn="auto" latinLnBrk="0" hangingPunct="1">
+              <a:lnSpc>
+                <a:spcPct val="100000"/>
+              </a:lnSpc>
+              <a:spcBef>
+                <a:spcPts val="0"/>
+              </a:spcBef>
+              <a:spcAft>
+                <a:spcPts val="0"/>
+              </a:spcAft>
+              <a:buClrTx/>
+              <a:buSzTx/>
+              <a:buFontTx/>
+              <a:buNone/>
+              <a:tabLst/>
+              <a:defRPr/>
+            </a:pPr>
+            <a:r>
+              <a:rPr kumimoji="0" lang="en-AU" sz="1100" b="0" i="0" u="none" strike="noStrike" kern="1200" cap="none" spc="0" normalizeH="0" baseline="0" noProof="0" dirty="0">
+                <a:ln>
+                  <a:noFill/>
+                </a:ln>
+                <a:solidFill>
+                  <a:srgbClr val="000000"/>
+                </a:solidFill>
+                <a:effectLst/>
+                <a:uLnTx/>
+                <a:uFillTx/>
+                <a:latin typeface="Calibri" panose="020F0502020204030204" pitchFamily="34" charset="0"/>
+                <a:cs typeface="Calibri" panose="020F0502020204030204" pitchFamily="34" charset="0"/>
+              </a:rPr>
+              <a:t>}</a:t>
+            </a:r>
+          </a:p>
+        </p:txBody>
+      </p:sp>
+      <p:sp>
+        <p:nvSpPr>
+          <p:cNvPr id="80" name="Rectangle 79">
+            <a:extLst>
+              <a:ext uri="{FF2B5EF4-FFF2-40B4-BE49-F238E27FC236}">
+                <a16:creationId xmlns:a16="http://schemas.microsoft.com/office/drawing/2014/main" id="{649424B0-5BEA-4333-960A-DB2246FA60DE}"/>
+              </a:ext>
+            </a:extLst>
+          </p:cNvPr>
+          <p:cNvSpPr/>
+          <p:nvPr/>
+        </p:nvSpPr>
+        <p:spPr>
+          <a:xfrm>
+            <a:off x="6277515" y="4576491"/>
+            <a:ext cx="1018774" cy="936002"/>
+          </a:xfrm>
+          <a:prstGeom prst="rect">
+            <a:avLst/>
+          </a:prstGeom>
+          <a:solidFill>
+            <a:srgbClr val="FFD44B"/>
+          </a:solidFill>
+          <a:ln w="12700" cap="flat" cmpd="sng" algn="ctr">
+            <a:solidFill>
+              <a:srgbClr val="4472C4">
+                <a:shade val="50000"/>
+              </a:srgbClr>
+            </a:solidFill>
+            <a:prstDash val="solid"/>
+            <a:miter lim="800000"/>
+          </a:ln>
+          <a:effectLst/>
+        </p:spPr>
+        <p:txBody>
+          <a:bodyPr rtlCol="0" anchor="ctr"/>
+          <a:lstStyle/>
+          <a:p>
+            <a:pPr marL="0" marR="0" lvl="0" indent="0" algn="ctr" defTabSz="914400" rtl="0" eaLnBrk="1" fontAlgn="auto" latinLnBrk="0" hangingPunct="1">
+              <a:lnSpc>
+                <a:spcPct val="100000"/>
+              </a:lnSpc>
+              <a:spcBef>
+                <a:spcPts val="0"/>
+              </a:spcBef>
+              <a:spcAft>
+                <a:spcPts val="0"/>
+              </a:spcAft>
+              <a:buClrTx/>
+              <a:buSzTx/>
+              <a:buFontTx/>
+              <a:buNone/>
+              <a:tabLst/>
+              <a:defRPr/>
+            </a:pPr>
+            <a:r>
+              <a:rPr kumimoji="0" lang="en-AU" sz="1200" b="0" i="0" u="none" strike="noStrike" kern="0" cap="none" spc="0" normalizeH="0" baseline="0" noProof="0" dirty="0">
+                <a:ln>
+                  <a:noFill/>
+                </a:ln>
+                <a:solidFill>
+                  <a:srgbClr val="000000"/>
+                </a:solidFill>
+                <a:effectLst/>
+                <a:uLnTx/>
+                <a:uFillTx/>
+                <a:latin typeface="Calibri" panose="020F0502020204030204" pitchFamily="34" charset="0"/>
+                <a:ea typeface="Verdana" panose="020B0604030504040204" pitchFamily="34" charset="0"/>
+                <a:cs typeface="Calibri" panose="020F0502020204030204" pitchFamily="34" charset="0"/>
+              </a:rPr>
+              <a:t>Device twin virtual HVAC control</a:t>
+            </a:r>
+          </a:p>
+        </p:txBody>
+      </p:sp>
+      <p:sp>
+        <p:nvSpPr>
+          <p:cNvPr id="87" name="Oval 86">
+            <a:extLst>
+              <a:ext uri="{FF2B5EF4-FFF2-40B4-BE49-F238E27FC236}">
+                <a16:creationId xmlns:a16="http://schemas.microsoft.com/office/drawing/2014/main" id="{022F6089-A562-4BCC-A890-5472D59BB117}"/>
+              </a:ext>
+            </a:extLst>
+          </p:cNvPr>
+          <p:cNvSpPr/>
+          <p:nvPr/>
+        </p:nvSpPr>
+        <p:spPr>
+          <a:xfrm>
+            <a:off x="5694097" y="4828472"/>
+            <a:ext cx="256674" cy="248652"/>
+          </a:xfrm>
+          <a:prstGeom prst="ellipse">
+            <a:avLst/>
+          </a:prstGeom>
+          <a:solidFill>
+            <a:srgbClr val="5B9BD5">
+              <a:lumMod val="75000"/>
+            </a:srgbClr>
+          </a:solidFill>
+          <a:ln w="12700" cap="flat" cmpd="sng" algn="ctr">
+            <a:solidFill>
+              <a:srgbClr val="4472C4">
+                <a:shade val="50000"/>
+              </a:srgbClr>
+            </a:solidFill>
+            <a:prstDash val="solid"/>
+            <a:miter lim="800000"/>
+          </a:ln>
+          <a:effectLst/>
+        </p:spPr>
+        <p:txBody>
+          <a:bodyPr rtlCol="0" anchor="ctr"/>
+          <a:lstStyle/>
+          <a:p>
+            <a:pPr marL="0" marR="0" lvl="0" indent="0" algn="ctr" defTabSz="914400" rtl="0" eaLnBrk="1" fontAlgn="auto" latinLnBrk="0" hangingPunct="1">
+              <a:lnSpc>
+                <a:spcPct val="100000"/>
+              </a:lnSpc>
+              <a:spcBef>
+                <a:spcPts val="0"/>
+              </a:spcBef>
+              <a:spcAft>
+                <a:spcPts val="0"/>
+              </a:spcAft>
+              <a:buClrTx/>
+              <a:buSzTx/>
+              <a:buFontTx/>
+              <a:buNone/>
+              <a:tabLst/>
+              <a:defRPr/>
+            </a:pPr>
+            <a:r>
+              <a:rPr kumimoji="0" lang="en-AU" sz="1100" b="0" i="0" u="none" strike="noStrike" kern="0" cap="none" spc="0" normalizeH="0" baseline="0" noProof="0" dirty="0">
+                <a:ln>
+                  <a:noFill/>
+                </a:ln>
+                <a:solidFill>
+                  <a:prstClr val="white"/>
+                </a:solidFill>
+                <a:effectLst/>
+                <a:uLnTx/>
+                <a:uFillTx/>
+                <a:latin typeface="Calibri" panose="020F0502020204030204" pitchFamily="34" charset="0"/>
+                <a:ea typeface="Verdana" panose="020B0604030504040204" pitchFamily="34" charset="0"/>
+                <a:cs typeface="Calibri" panose="020F0502020204030204" pitchFamily="34" charset="0"/>
+              </a:rPr>
+              <a:t>5</a:t>
+            </a:r>
+          </a:p>
+        </p:txBody>
+      </p:sp>
+      <p:sp>
+        <p:nvSpPr>
+          <p:cNvPr id="90" name="Oval 89">
+            <a:extLst>
+              <a:ext uri="{FF2B5EF4-FFF2-40B4-BE49-F238E27FC236}">
+                <a16:creationId xmlns:a16="http://schemas.microsoft.com/office/drawing/2014/main" id="{3743A529-93A2-4B61-93EE-AB900B6B8F17}"/>
+              </a:ext>
+            </a:extLst>
+          </p:cNvPr>
+          <p:cNvSpPr/>
+          <p:nvPr/>
+        </p:nvSpPr>
+        <p:spPr>
+          <a:xfrm>
+            <a:off x="11170578" y="4920514"/>
+            <a:ext cx="256674" cy="248652"/>
+          </a:xfrm>
+          <a:prstGeom prst="ellipse">
+            <a:avLst/>
+          </a:prstGeom>
+          <a:solidFill>
+            <a:srgbClr val="5B9BD5">
+              <a:lumMod val="75000"/>
+            </a:srgbClr>
+          </a:solidFill>
+          <a:ln w="12700" cap="flat" cmpd="sng" algn="ctr">
+            <a:solidFill>
+              <a:srgbClr val="4472C4">
+                <a:shade val="50000"/>
+              </a:srgbClr>
+            </a:solidFill>
+            <a:prstDash val="solid"/>
+            <a:miter lim="800000"/>
+          </a:ln>
+          <a:effectLst/>
+        </p:spPr>
+        <p:txBody>
+          <a:bodyPr rtlCol="0" anchor="ctr"/>
+          <a:lstStyle/>
+          <a:p>
+            <a:pPr marL="0" marR="0" lvl="0" indent="0" algn="ctr" defTabSz="914400" rtl="0" eaLnBrk="1" fontAlgn="auto" latinLnBrk="0" hangingPunct="1">
+              <a:lnSpc>
+                <a:spcPct val="100000"/>
+              </a:lnSpc>
+              <a:spcBef>
+                <a:spcPts val="0"/>
+              </a:spcBef>
+              <a:spcAft>
+                <a:spcPts val="0"/>
+              </a:spcAft>
+              <a:buClrTx/>
+              <a:buSzTx/>
+              <a:buFontTx/>
+              <a:buNone/>
+              <a:tabLst/>
+              <a:defRPr/>
+            </a:pPr>
+            <a:r>
+              <a:rPr kumimoji="0" lang="en-AU" sz="1100" b="0" i="0" u="none" strike="noStrike" kern="0" cap="none" spc="0" normalizeH="0" baseline="0" noProof="0" dirty="0">
+                <a:ln>
+                  <a:noFill/>
+                </a:ln>
+                <a:solidFill>
+                  <a:prstClr val="white"/>
+                </a:solidFill>
+                <a:effectLst/>
+                <a:uLnTx/>
+                <a:uFillTx/>
+                <a:latin typeface="Calibri" panose="020F0502020204030204" pitchFamily="34" charset="0"/>
+                <a:ea typeface="Verdana" panose="020B0604030504040204" pitchFamily="34" charset="0"/>
+                <a:cs typeface="Calibri" panose="020F0502020204030204" pitchFamily="34" charset="0"/>
+              </a:rPr>
+              <a:t>5</a:t>
+            </a:r>
+          </a:p>
+        </p:txBody>
+      </p:sp>
+      <p:cxnSp>
+        <p:nvCxnSpPr>
+          <p:cNvPr id="39" name="Straight Arrow Connector 38">
+            <a:extLst>
+              <a:ext uri="{FF2B5EF4-FFF2-40B4-BE49-F238E27FC236}">
+                <a16:creationId xmlns:a16="http://schemas.microsoft.com/office/drawing/2014/main" id="{F979FA1E-ADAC-4EE1-87A8-A05719F402E3}"/>
+              </a:ext>
+            </a:extLst>
+          </p:cNvPr>
+          <p:cNvCxnSpPr>
+            <a:cxnSpLocks/>
+          </p:cNvCxnSpPr>
+          <p:nvPr/>
+        </p:nvCxnSpPr>
+        <p:spPr>
+          <a:xfrm flipV="1">
+            <a:off x="5391385" y="5168784"/>
+            <a:ext cx="915242" cy="382"/>
+          </a:xfrm>
+          <a:prstGeom prst="straightConnector1">
+            <a:avLst/>
+          </a:prstGeom>
+          <a:noFill/>
+          <a:ln w="38100" cap="flat" cmpd="sng" algn="ctr">
+            <a:solidFill>
+              <a:srgbClr val="4472C4"/>
+            </a:solidFill>
+            <a:prstDash val="solid"/>
+            <a:miter lim="800000"/>
+            <a:headEnd type="triangle" w="med" len="med"/>
+            <a:tailEnd type="triangle" w="med" len="med"/>
+          </a:ln>
+          <a:effectLst/>
+        </p:spPr>
+      </p:cxnSp>
+      <p:pic>
+        <p:nvPicPr>
+          <p:cNvPr id="22" name="Picture 21">
+            <a:extLst>
+              <a:ext uri="{FF2B5EF4-FFF2-40B4-BE49-F238E27FC236}">
+                <a16:creationId xmlns:a16="http://schemas.microsoft.com/office/drawing/2014/main" id="{E16D0359-E9B7-45B3-83E5-35DF02BD9296}"/>
+              </a:ext>
+            </a:extLst>
+          </p:cNvPr>
+          <p:cNvPicPr>
+            <a:picLocks noChangeAspect="1"/>
+          </p:cNvPicPr>
+          <p:nvPr/>
+        </p:nvPicPr>
+        <p:blipFill>
+          <a:blip r:embed="rId8"/>
+          <a:stretch>
+            <a:fillRect/>
+          </a:stretch>
+        </p:blipFill>
+        <p:spPr>
+          <a:xfrm>
+            <a:off x="1975704" y="3090103"/>
+            <a:ext cx="1135409" cy="936214"/>
+          </a:xfrm>
+          <a:prstGeom prst="rect">
+            <a:avLst/>
+          </a:prstGeom>
+        </p:spPr>
+      </p:pic>
+    </p:spTree>
+    <p:extLst>
+      <p:ext uri="{BB962C8B-B14F-4D97-AF65-F5344CB8AC3E}">
+        <p14:creationId xmlns:p14="http://schemas.microsoft.com/office/powerpoint/2010/main" val="3638010040"/>
       </p:ext>
     </p:extLst>
   </p:cSld>

</xml_diff>